<commit_message>
Fixes table in data transformation sheet
</commit_message>
<xml_diff>
--- a/powerpoints/data-transformation.pptx
+++ b/powerpoints/data-transformation.pptx
@@ -30138,9 +30138,7 @@
                       </a:solidFill>
                       <a:miter lim="400000"/>
                     </a:lnB>
-                    <a:solidFill>
-                      <a:srgbClr val="D0D1D2"/>
-                    </a:solidFill>
+                    <a:noFill/>
                   </a:tcPr>
                 </a:tc>
                 <a:tc>

</xml_diff>

<commit_message>
Fixes typo in data transformation sheet
</commit_message>
<xml_diff>
--- a/powerpoints/data-transformation.pptx
+++ b/powerpoints/data-transformation.pptx
@@ -22761,7 +22761,7 @@
               </a:defRPr>
             </a:pPr>
             <a:r>
-              <a:t>Rows that appear in both x and z.</a:t>
+              <a:t>Rows that appear in both x and y.</a:t>
             </a:r>
           </a:p>
           <a:p>
@@ -22812,7 +22812,7 @@
               </a:defRPr>
             </a:pPr>
             <a:r>
-              <a:t>Rows that appear in x but not z.</a:t>
+              <a:t>Rows that appear in x but not y.</a:t>
             </a:r>
           </a:p>
           <a:p>
@@ -22863,7 +22863,7 @@
               </a:defRPr>
             </a:pPr>
             <a:r>
-              <a:t>Rows that appear in x or z. </a:t>
+              <a:t>Rows that appear in x or y. </a:t>
             </a:r>
             <a:br/>
             <a:r>

</xml_diff>

<commit_message>
corrects minor flaws in data transformation sheatsheet
</commit_message>
<xml_diff>
--- a/powerpoints/data-transformation.pptx
+++ b/powerpoints/data-transformation.pptx
@@ -4825,7 +4825,7 @@
       </p:sp>
       <p:sp>
         <p:nvSpPr>
-          <p:cNvPr id="132" name="Use group_by() to created a &quot;grouped&quot; copy of a table.  dplyr functions will manipulate each &quot;group&quot; separately and then combine the results."/>
+          <p:cNvPr id="132" name="Use group_by() to create a &quot;grouped&quot; copy of a table.  dplyr functions will manipulate each &quot;group&quot; separately and then combine the results."/>
           <p:cNvSpPr txBox="1"/>
           <p:nvPr/>
         </p:nvSpPr>
@@ -4873,7 +4873,7 @@
               <a:t>group_by()</a:t>
             </a:r>
             <a:r>
-              <a:t> to created a "grouped" copy of a table. </a:t>
+              <a:t> to create a "grouped" copy of a table. </a:t>
             </a:r>
             <a:br/>
             <a:r>
@@ -7572,7 +7572,7 @@
       </p:graphicFrame>
       <p:sp>
         <p:nvSpPr>
-          <p:cNvPr id="158" name="arrange(.data, …)…"/>
+          <p:cNvPr id="158" name="arrange(.data, …) Order rows by values of a column or columns (low to high), use with desc() to order from high to low.…"/>
           <p:cNvSpPr txBox="1"/>
           <p:nvPr/>
         </p:nvSpPr>
@@ -7621,25 +7621,10 @@
             </a:r>
             <a:r>
               <a:rPr b="1"/>
-              <a:t>)</a:t>
-            </a:r>
-          </a:p>
-          <a:p>
-            <a:pPr>
-              <a:lnSpc>
-                <a:spcPct val="80000"/>
-              </a:lnSpc>
-              <a:spcBef>
-                <a:spcPts val="0"/>
-              </a:spcBef>
-              <a:defRPr b="0">
-                <a:solidFill>
-                  <a:srgbClr val="000000"/>
-                </a:solidFill>
-              </a:defRPr>
-            </a:pPr>
-            <a:r>
-              <a:t>Order rows by values of a column (low to high), use with </a:t>
+              <a:t>) </a:t>
+            </a:r>
+            <a:r>
+              <a:t>Order rows by values of a column or columns (low to high), use with </a:t>
             </a:r>
             <a:r>
               <a:rPr b="1"/>
@@ -20500,11 +20485,11 @@
               </a:defRPr>
             </a:pPr>
             <a:r>
-              <a:t>             s</a:t>
+              <a:t>             </a:t>
             </a:r>
             <a:r>
               <a:rPr b="1"/>
-              <a:t>um(!is.na())</a:t>
+              <a:t>sum(!is.na())</a:t>
             </a:r>
             <a:r>
               <a:t> - # of non-NA’s</a:t>
@@ -20867,7 +20852,7 @@
               </a:defRPr>
             </a:pPr>
             <a:r>
-              <a:t>             mad() - mean absolute deviation</a:t>
+              <a:t>             mad() - median absolute deviation</a:t>
             </a:r>
           </a:p>
           <a:p>
@@ -21665,7 +21650,7 @@
         <p:spPr>
           <a:xfrm>
             <a:off x="3734004" y="9988072"/>
-            <a:ext cx="2885593" cy="190501"/>
+            <a:ext cx="2896871" cy="190501"/>
           </a:xfrm>
           <a:prstGeom prst="rect">
             <a:avLst/>
@@ -21699,11 +21684,11 @@
               </a:defRPr>
             </a:pPr>
             <a:r>
-              <a:t>Also has_</a:t>
+              <a:t>Also </a:t>
             </a:r>
             <a:r>
               <a:rPr b="1"/>
-              <a:t>rownames()</a:t>
+              <a:t>has_rownames()</a:t>
             </a:r>
             <a:r>
               <a:t>, </a:t>

</xml_diff>

<commit_message>
Changes vectorised functions to vector functions in Data transformation cheatsheet
</commit_message>
<xml_diff>
--- a/powerpoints/data-transformation.pptx
+++ b/powerpoints/data-transformation.pptx
@@ -20032,14 +20032,14 @@
       </p:sp>
       <p:sp>
         <p:nvSpPr>
-          <p:cNvPr id="249" name="Vectorized Functions"/>
+          <p:cNvPr id="249" name="Vector Functions"/>
           <p:cNvSpPr txBox="1"/>
           <p:nvPr/>
         </p:nvSpPr>
         <p:spPr>
           <a:xfrm>
             <a:off x="320788" y="691629"/>
-            <a:ext cx="2792096" cy="431801"/>
+            <a:ext cx="2248536" cy="431801"/>
           </a:xfrm>
           <a:prstGeom prst="rect">
             <a:avLst/>
@@ -20073,7 +20073,7 @@
               </a:defRPr>
             </a:pPr>
             <a:r>
-              <a:t>Vectorized Functions</a:t>
+              <a:t>Vector Functions</a:t>
             </a:r>
           </a:p>
         </p:txBody>

</xml_diff>

<commit_message>
Updates dplyr cheatsheet to v 0.7.0
</commit_message>
<xml_diff>
--- a/powerpoints/data-transformation.pptx
+++ b/powerpoints/data-transformation.pptx
@@ -2989,9 +2989,38 @@
           <a:chExt cx="0" cy="0"/>
         </a:xfrm>
       </p:grpSpPr>
+      <p:pic>
+        <p:nvPicPr>
+          <p:cNvPr id="119" name="Image" descr="Image"/>
+          <p:cNvPicPr>
+            <a:picLocks noChangeAspect="1"/>
+          </p:cNvPicPr>
+          <p:nvPr/>
+        </p:nvPicPr>
+        <p:blipFill>
+          <a:blip r:embed="rId2">
+            <a:extLst/>
+          </a:blip>
+          <a:stretch>
+            <a:fillRect/>
+          </a:stretch>
+        </p:blipFill>
+        <p:spPr>
+          <a:xfrm>
+            <a:off x="8369105" y="-684523"/>
+            <a:ext cx="5603817" cy="2992964"/>
+          </a:xfrm>
+          <a:prstGeom prst="rect">
+            <a:avLst/>
+          </a:prstGeom>
+          <a:ln w="12700">
+            <a:miter lim="400000"/>
+          </a:ln>
+        </p:spPr>
+      </p:pic>
       <p:sp>
         <p:nvSpPr>
-          <p:cNvPr id="119" name="Rectangle"/>
+          <p:cNvPr id="120" name="Rectangle"/>
           <p:cNvSpPr/>
           <p:nvPr/>
         </p:nvSpPr>
@@ -3044,7 +3073,7 @@
       </p:sp>
       <p:sp>
         <p:nvSpPr>
-          <p:cNvPr id="120" name="Line"/>
+          <p:cNvPr id="121" name="Line"/>
           <p:cNvSpPr/>
           <p:nvPr/>
         </p:nvSpPr>
@@ -3085,7 +3114,7 @@
       </p:sp>
       <p:sp>
         <p:nvSpPr>
-          <p:cNvPr id="121" name="Rectangle"/>
+          <p:cNvPr id="122" name="Rectangle"/>
           <p:cNvSpPr/>
           <p:nvPr/>
         </p:nvSpPr>
@@ -3138,7 +3167,7 @@
       </p:sp>
       <p:sp>
         <p:nvSpPr>
-          <p:cNvPr id="122" name="Summarise Cases"/>
+          <p:cNvPr id="123" name="Summarise Cases"/>
           <p:cNvSpPr txBox="1"/>
           <p:nvPr/>
         </p:nvSpPr>
@@ -3186,7 +3215,7 @@
       </p:sp>
       <p:sp>
         <p:nvSpPr>
-          <p:cNvPr id="123" name="Rounded Rectangle"/>
+          <p:cNvPr id="124" name="Rounded Rectangle"/>
           <p:cNvSpPr/>
           <p:nvPr/>
         </p:nvSpPr>
@@ -3224,7 +3253,7 @@
       </p:sp>
       <p:sp>
         <p:nvSpPr>
-          <p:cNvPr id="124" name="group_by(.data, ..., add = FALSE)…"/>
+          <p:cNvPr id="125" name="group_by(.data, ..., add = FALSE)…"/>
           <p:cNvSpPr txBox="1"/>
           <p:nvPr/>
         </p:nvSpPr>
@@ -3384,7 +3413,7 @@
       </p:sp>
       <p:graphicFrame>
         <p:nvGraphicFramePr>
-          <p:cNvPr id="125" name="Table"/>
+          <p:cNvPr id="126" name="Table"/>
           <p:cNvGraphicFramePr/>
           <p:nvPr/>
         </p:nvGraphicFramePr>
@@ -3847,7 +3876,7 @@
       </p:graphicFrame>
       <p:graphicFrame>
         <p:nvGraphicFramePr>
-          <p:cNvPr id="126" name="Table"/>
+          <p:cNvPr id="127" name="Table"/>
           <p:cNvGraphicFramePr/>
           <p:nvPr/>
         </p:nvGraphicFramePr>
@@ -4100,7 +4129,7 @@
       </p:graphicFrame>
       <p:sp>
         <p:nvSpPr>
-          <p:cNvPr id="127" name="Line"/>
+          <p:cNvPr id="128" name="Line"/>
           <p:cNvSpPr/>
           <p:nvPr/>
         </p:nvSpPr>
@@ -4153,7 +4182,7 @@
       </p:sp>
       <p:graphicFrame>
         <p:nvGraphicFramePr>
-          <p:cNvPr id="128" name="Table"/>
+          <p:cNvPr id="129" name="Table"/>
           <p:cNvGraphicFramePr/>
           <p:nvPr/>
         </p:nvGraphicFramePr>
@@ -4308,7 +4337,7 @@
       </p:graphicFrame>
       <p:graphicFrame>
         <p:nvGraphicFramePr>
-          <p:cNvPr id="129" name="Table"/>
+          <p:cNvPr id="130" name="Table"/>
           <p:cNvGraphicFramePr/>
           <p:nvPr/>
         </p:nvGraphicFramePr>
@@ -4457,7 +4486,7 @@
       </p:graphicFrame>
       <p:graphicFrame>
         <p:nvGraphicFramePr>
-          <p:cNvPr id="130" name="Table"/>
+          <p:cNvPr id="131" name="Table"/>
           <p:cNvGraphicFramePr/>
           <p:nvPr/>
         </p:nvGraphicFramePr>
@@ -4772,7 +4801,7 @@
       </p:graphicFrame>
       <p:sp>
         <p:nvSpPr>
-          <p:cNvPr id="131" name="Line"/>
+          <p:cNvPr id="132" name="Line"/>
           <p:cNvSpPr/>
           <p:nvPr/>
         </p:nvSpPr>
@@ -4825,7 +4854,7 @@
       </p:sp>
       <p:sp>
         <p:nvSpPr>
-          <p:cNvPr id="132" name="Use group_by() to create a &quot;grouped&quot; copy of a table.  dplyr functions will manipulate each &quot;group&quot; separately and then combine the results."/>
+          <p:cNvPr id="133" name="Use group_by() to create a &quot;grouped&quot; copy of a table.  dplyr functions will manipulate each &quot;group&quot; separately and then combine the results."/>
           <p:cNvSpPr txBox="1"/>
           <p:nvPr/>
         </p:nvSpPr>
@@ -4884,7 +4913,7 @@
       </p:sp>
       <p:sp>
         <p:nvSpPr>
-          <p:cNvPr id="133" name="mtcars %&gt;%…"/>
+          <p:cNvPr id="134" name="mtcars %&gt;%…"/>
           <p:cNvSpPr txBox="1"/>
           <p:nvPr/>
         </p:nvSpPr>
@@ -4968,13 +4997,13 @@
       </p:sp>
       <p:sp>
         <p:nvSpPr>
-          <p:cNvPr id="134" name="These apply summary functions to columns to create a new table. Summary functions take vectors as input and return one value (see back)."/>
+          <p:cNvPr id="135" name="These apply summary functions to columns to create a new table of summary statistics. Summary functions take vectors as input and return one value (see back)."/>
           <p:cNvSpPr txBox="1"/>
           <p:nvPr/>
         </p:nvSpPr>
         <p:spPr>
           <a:xfrm>
-            <a:off x="323328" y="3478309"/>
+            <a:off x="323328" y="3529109"/>
             <a:ext cx="4140391" cy="634374"/>
           </a:xfrm>
           <a:prstGeom prst="rect">
@@ -5016,20 +5045,20 @@
               <a:t>summary functions</a:t>
             </a:r>
             <a:r>
-              <a:t> to columns to create a new table. Summary functions take vectors as input and return one value (see back).</a:t>
+              <a:t> to columns to create a new table of summary statistics. Summary functions take vectors as input and return one value (see back).</a:t>
             </a:r>
           </a:p>
         </p:txBody>
       </p:sp>
       <p:sp>
         <p:nvSpPr>
-          <p:cNvPr id="135" name="VARIATIONS…"/>
+          <p:cNvPr id="136" name="VARIATIONS…"/>
           <p:cNvSpPr txBox="1"/>
           <p:nvPr/>
         </p:nvSpPr>
         <p:spPr>
           <a:xfrm>
-            <a:off x="323328" y="5885415"/>
+            <a:off x="323328" y="5936215"/>
             <a:ext cx="3243987" cy="736601"/>
           </a:xfrm>
           <a:prstGeom prst="rect">
@@ -5125,12 +5154,12 @@
       </p:sp>
       <p:graphicFrame>
         <p:nvGraphicFramePr>
-          <p:cNvPr id="136" name="Table"/>
+          <p:cNvPr id="137" name="Table"/>
           <p:cNvGraphicFramePr/>
           <p:nvPr/>
         </p:nvGraphicFramePr>
         <p:xfrm>
-          <a:off x="323328" y="4378193"/>
+          <a:off x="323328" y="4530593"/>
           <a:ext cx="650940" cy="609601"/>
         </p:xfrm>
         <a:graphic xmlns:a="http://schemas.openxmlformats.org/drawingml/2006/main">
@@ -5407,12 +5436,12 @@
       </p:graphicFrame>
       <p:graphicFrame>
         <p:nvGraphicFramePr>
-          <p:cNvPr id="137" name="Table"/>
+          <p:cNvPr id="138" name="Table"/>
           <p:cNvGraphicFramePr/>
           <p:nvPr/>
         </p:nvGraphicFramePr>
         <p:xfrm>
-          <a:off x="881133" y="4377389"/>
+          <a:off x="881133" y="4529789"/>
           <a:ext cx="650940" cy="609601"/>
         </p:xfrm>
         <a:graphic xmlns:a="http://schemas.openxmlformats.org/drawingml/2006/main">
@@ -5568,13 +5597,13 @@
       </p:graphicFrame>
       <p:sp>
         <p:nvSpPr>
-          <p:cNvPr id="138" name="Line"/>
+          <p:cNvPr id="139" name="Line"/>
           <p:cNvSpPr/>
           <p:nvPr/>
         </p:nvSpPr>
         <p:spPr>
           <a:xfrm>
-            <a:off x="709542" y="4494842"/>
+            <a:off x="709542" y="4647242"/>
             <a:ext cx="139605" cy="1"/>
           </a:xfrm>
           <a:prstGeom prst="line">
@@ -5621,12 +5650,12 @@
       </p:sp>
       <p:graphicFrame>
         <p:nvGraphicFramePr>
-          <p:cNvPr id="139" name="Table"/>
+          <p:cNvPr id="140" name="Table"/>
           <p:cNvGraphicFramePr/>
           <p:nvPr/>
         </p:nvGraphicFramePr>
         <p:xfrm>
-          <a:off x="323328" y="5142269"/>
+          <a:off x="323328" y="5294669"/>
           <a:ext cx="650940" cy="609601"/>
         </p:xfrm>
         <a:graphic xmlns:a="http://schemas.openxmlformats.org/drawingml/2006/main">
@@ -5903,12 +5932,12 @@
       </p:graphicFrame>
       <p:graphicFrame>
         <p:nvGraphicFramePr>
-          <p:cNvPr id="140" name="Table"/>
+          <p:cNvPr id="141" name="Table"/>
           <p:cNvGraphicFramePr/>
           <p:nvPr/>
         </p:nvGraphicFramePr>
         <p:xfrm>
-          <a:off x="882128" y="5144618"/>
+          <a:off x="882128" y="5297018"/>
           <a:ext cx="650940" cy="609601"/>
         </p:xfrm>
         <a:graphic xmlns:a="http://schemas.openxmlformats.org/drawingml/2006/main">
@@ -5972,13 +6001,13 @@
       </p:graphicFrame>
       <p:sp>
         <p:nvSpPr>
-          <p:cNvPr id="141" name="Line"/>
+          <p:cNvPr id="142" name="Line"/>
           <p:cNvSpPr/>
           <p:nvPr/>
         </p:nvSpPr>
         <p:spPr>
           <a:xfrm>
-            <a:off x="709542" y="5258918"/>
+            <a:off x="709542" y="5411318"/>
             <a:ext cx="139605" cy="1"/>
           </a:xfrm>
           <a:prstGeom prst="line">
@@ -6025,13 +6054,13 @@
       </p:sp>
       <p:sp>
         <p:nvSpPr>
-          <p:cNvPr id="142" name="summarise(.data, …) Compute table of summaries. Also summarise_().  summarise(mtcars, avg = mean(mpg))…"/>
+          <p:cNvPr id="143" name="summarise(.data, …) Compute table of summaries.  summarise(mtcars, avg = mean(mpg))…"/>
           <p:cNvSpPr txBox="1"/>
           <p:nvPr/>
         </p:nvSpPr>
         <p:spPr>
           <a:xfrm>
-            <a:off x="1388325" y="4314592"/>
+            <a:off x="1388325" y="4466992"/>
             <a:ext cx="2908472" cy="1644017"/>
           </a:xfrm>
           <a:prstGeom prst="rect">
@@ -6074,14 +6103,7 @@
             </a:r>
             <a:br/>
             <a:r>
-              <a:t>Compute table of summaries. Also </a:t>
-            </a:r>
-            <a:r>
-              <a:rPr b="1"/>
-              <a:t>summarise_</a:t>
-            </a:r>
-            <a:r>
-              <a:t>(). </a:t>
+              <a:t>Compute table of summaries. </a:t>
             </a:r>
             <a:br/>
             <a:r>
@@ -6146,7 +6168,7 @@
       </p:sp>
       <p:sp>
         <p:nvSpPr>
-          <p:cNvPr id="143" name="RStudio® is a trademark of RStudio, Inc.  •  CC BY SA RStudio •  info@rstudio.com  •  844-448-1212 • rstudio.com •  Learn more with browseVignettes(package = c(&quot;dplyr&quot;, &quot;tibble&quot;))  •  dplyr  0.5.0 •  tibble  1.2.0  •  Updated: 2017-01"/>
+          <p:cNvPr id="144" name="RStudio® is a trademark of RStudio, Inc.  •  CC BY SA RStudio •  info@rstudio.com  •  844-448-1212 • rstudio.com •  Learn more with browseVignettes(package = c(&quot;dplyr&quot;, &quot;tibble&quot;))  •  dplyr  0.7.0 •  tibble  1.2.0  •  Updated: 2017-03"/>
           <p:cNvSpPr txBox="1"/>
           <p:nvPr/>
         </p:nvSpPr>
@@ -6191,37 +6213,37 @@
             </a:r>
             <a:r>
               <a:rPr>
-                <a:hlinkClick r:id="rId2" invalidUrl="" action="" tgtFrame="" tooltip="" history="1" highlightClick="0" endSnd="0"/>
+                <a:hlinkClick r:id="rId3" invalidUrl="" action="" tgtFrame="" tooltip="" history="1" highlightClick="0" endSnd="0"/>
               </a:rPr>
               <a:t>CC BY SA</a:t>
             </a:r>
             <a:r>
               <a:t> RStudio •  </a:t>
-            </a:r>
-            <a:r>
-              <a:rPr>
-                <a:hlinkClick r:id="rId3" invalidUrl="" action="" tgtFrame="" tooltip="" history="1" highlightClick="0" endSnd="0"/>
-              </a:rPr>
-              <a:t>info@rstudio.com</a:t>
-            </a:r>
-            <a:r>
-              <a:t>  •  844-448-1212 • </a:t>
             </a:r>
             <a:r>
               <a:rPr>
                 <a:hlinkClick r:id="rId4" invalidUrl="" action="" tgtFrame="" tooltip="" history="1" highlightClick="0" endSnd="0"/>
               </a:rPr>
+              <a:t>info@rstudio.com</a:t>
+            </a:r>
+            <a:r>
+              <a:t>  •  844-448-1212 • </a:t>
+            </a:r>
+            <a:r>
+              <a:rPr>
+                <a:hlinkClick r:id="rId5" invalidUrl="" action="" tgtFrame="" tooltip="" history="1" highlightClick="0" endSnd="0"/>
+              </a:rPr>
               <a:t>rstudio.com</a:t>
             </a:r>
             <a:r>
-              <a:t> •  Learn more with browseVignettes(package = c("dplyr", "tibble"))  •  dplyr  0.5.0 •  tibble  1.2.0  •  Updated: 2017-01</a:t>
+              <a:t> •  Learn more with browseVignettes(package = c("dplyr", "tibble"))  •  dplyr  0.7.0 •  tibble  1.2.0  •  Updated: 2017-03</a:t>
             </a:r>
           </a:p>
         </p:txBody>
       </p:sp>
       <p:sp>
         <p:nvSpPr>
-          <p:cNvPr id="144" name="Each observation, or case, is in its own row"/>
+          <p:cNvPr id="145" name="Each observation, or case, is in its own row"/>
           <p:cNvSpPr txBox="1"/>
           <p:nvPr/>
         </p:nvSpPr>
@@ -6301,7 +6323,7 @@
       </p:sp>
       <p:sp>
         <p:nvSpPr>
-          <p:cNvPr id="145" name="Each variable is in its own column"/>
+          <p:cNvPr id="146" name="Each variable is in its own column"/>
           <p:cNvSpPr txBox="1"/>
           <p:nvPr/>
         </p:nvSpPr>
@@ -6367,7 +6389,7 @@
       </p:sp>
       <p:sp>
         <p:nvSpPr>
-          <p:cNvPr id="146" name="&amp;"/>
+          <p:cNvPr id="147" name="&amp;"/>
           <p:cNvSpPr txBox="1"/>
           <p:nvPr/>
         </p:nvSpPr>
@@ -6411,7 +6433,7 @@
       </p:sp>
       <p:sp>
         <p:nvSpPr>
-          <p:cNvPr id="147" name="dplyr functions work with pipes and expect tidy data. In tidy data:"/>
+          <p:cNvPr id="148" name="dplyr functions work with pipes and expect tidy data. In tidy data:"/>
           <p:cNvSpPr txBox="1"/>
           <p:nvPr/>
         </p:nvSpPr>
@@ -6477,7 +6499,7 @@
       </p:sp>
       <p:sp>
         <p:nvSpPr>
-          <p:cNvPr id="148" name="pipes"/>
+          <p:cNvPr id="149" name="pipes"/>
           <p:cNvSpPr txBox="1"/>
           <p:nvPr/>
         </p:nvSpPr>
@@ -6525,7 +6547,7 @@
       </p:sp>
       <p:sp>
         <p:nvSpPr>
-          <p:cNvPr id="149" name="x %&gt;% f(y)…"/>
+          <p:cNvPr id="150" name="x %&gt;% f(y)…"/>
           <p:cNvSpPr txBox="1"/>
           <p:nvPr/>
         </p:nvSpPr>
@@ -6600,14 +6622,14 @@
       </p:sp>
       <p:pic>
         <p:nvPicPr>
-          <p:cNvPr id="150" name="Image" descr="Image"/>
+          <p:cNvPr id="151" name="Image" descr="Image"/>
           <p:cNvPicPr>
             <a:picLocks noChangeAspect="1"/>
           </p:cNvPicPr>
           <p:nvPr/>
         </p:nvPicPr>
         <p:blipFill>
-          <a:blip r:embed="rId5">
+          <a:blip r:embed="rId6">
             <a:extLst/>
           </a:blip>
           <a:stretch>
@@ -6629,14 +6651,14 @@
       </p:pic>
       <p:pic>
         <p:nvPicPr>
-          <p:cNvPr id="151" name="Image" descr="Image"/>
+          <p:cNvPr id="152" name="Image" descr="Image"/>
           <p:cNvPicPr>
             <a:picLocks noChangeAspect="1"/>
           </p:cNvPicPr>
           <p:nvPr/>
         </p:nvPicPr>
         <p:blipFill>
-          <a:blip r:embed="rId6">
+          <a:blip r:embed="rId7">
             <a:extLst/>
           </a:blip>
           <a:stretch>
@@ -6658,7 +6680,7 @@
       </p:pic>
       <p:sp>
         <p:nvSpPr>
-          <p:cNvPr id="152" name="Line"/>
+          <p:cNvPr id="153" name="Line"/>
           <p:cNvSpPr/>
           <p:nvPr/>
         </p:nvSpPr>
@@ -6699,13 +6721,13 @@
       </p:sp>
       <p:sp>
         <p:nvSpPr>
-          <p:cNvPr id="153" name="filter(.data, …) Extract rows that meet logical criteria. Also filter_(). filter(iris, Sepal.Length &gt; 7)…"/>
+          <p:cNvPr id="154" name="filter(.data, …) Extract rows that meet logical criteria. filter(iris, Sepal.Length &gt; 7)…"/>
           <p:cNvSpPr txBox="1"/>
           <p:nvPr/>
         </p:nvSpPr>
         <p:spPr>
           <a:xfrm>
-            <a:off x="5889308" y="2870520"/>
+            <a:off x="5889308" y="2756220"/>
             <a:ext cx="3030894" cy="3364495"/>
           </a:xfrm>
           <a:prstGeom prst="rect">
@@ -6751,14 +6773,7 @@
               <a:t>)</a:t>
             </a:r>
             <a:r>
-              <a:t> Extract rows that meet logical criteria. Also </a:t>
-            </a:r>
-            <a:r>
-              <a:rPr b="1"/>
-              <a:t>filter_()</a:t>
-            </a:r>
-            <a:r>
-              <a:t>. </a:t>
+              <a:t> Extract rows that meet logical criteria. </a:t>
             </a:r>
             <a:r>
               <a:rPr i="1"/>
@@ -6821,14 +6836,7 @@
               <a:t>)</a:t>
             </a:r>
             <a:r>
-              <a:t> Remove rows with duplicate values. Also </a:t>
-            </a:r>
-            <a:r>
-              <a:rPr b="1"/>
-              <a:t>distinct_()</a:t>
-            </a:r>
-            <a:r>
-              <a:t>. </a:t>
+              <a:t> Remove rows with duplicate values. </a:t>
             </a:r>
             <a:br/>
             <a:r>
@@ -6975,15 +6983,23 @@
               <a:t>)</a:t>
             </a:r>
             <a:r>
-              <a:t> Select rows by position. Also </a:t>
-            </a:r>
-            <a:r>
-              <a:rPr b="1"/>
-              <a:t>slice_()</a:t>
-            </a:r>
-            <a:r>
-              <a:t>. </a:t>
-            </a:r>
+              <a:t> Select rows by position. </a:t>
+            </a:r>
+          </a:p>
+          <a:p>
+            <a:pPr defTabSz="566674">
+              <a:lnSpc>
+                <a:spcPct val="80000"/>
+              </a:lnSpc>
+              <a:spcBef>
+                <a:spcPts val="0"/>
+              </a:spcBef>
+              <a:defRPr b="0" sz="1164">
+                <a:solidFill>
+                  <a:srgbClr val="000000"/>
+                </a:solidFill>
+              </a:defRPr>
+            </a:pPr>
             <a:r>
               <a:rPr i="1"/>
               <a:t>slice(iris, 10:15)</a:t>
@@ -7042,7 +7058,7 @@
       </p:sp>
       <p:sp>
         <p:nvSpPr>
-          <p:cNvPr id="154" name="Row functions return a subset of rows as a new table. Use a variant that ends in _ for non-standard evaluation friendly code."/>
+          <p:cNvPr id="155" name="Row functions return a subset of rows as a new table."/>
           <p:cNvSpPr txBox="1"/>
           <p:nvPr/>
         </p:nvSpPr>
@@ -7085,14 +7101,14 @@
           <a:p>
             <a:pPr/>
             <a:r>
-              <a:t>Row functions return a subset of rows as a new table. Use a variant that ends in _ for non-standard evaluation friendly code.</a:t>
+              <a:t>Row functions return a subset of rows as a new table.</a:t>
             </a:r>
           </a:p>
         </p:txBody>
       </p:sp>
       <p:sp>
         <p:nvSpPr>
-          <p:cNvPr id="155" name="See ?base::logic and ?Comparison for help."/>
+          <p:cNvPr id="156" name="See ?base::logic and ?Comparison for help."/>
           <p:cNvSpPr txBox="1"/>
           <p:nvPr/>
         </p:nvSpPr>
@@ -7154,7 +7170,7 @@
       </p:sp>
       <p:graphicFrame>
         <p:nvGraphicFramePr>
-          <p:cNvPr id="156" name="Table"/>
+          <p:cNvPr id="157" name="Table"/>
           <p:cNvGraphicFramePr/>
           <p:nvPr/>
         </p:nvGraphicFramePr>
@@ -7362,7 +7378,7 @@
       </p:graphicFrame>
       <p:graphicFrame>
         <p:nvGraphicFramePr>
-          <p:cNvPr id="157" name="Table"/>
+          <p:cNvPr id="158" name="Table"/>
           <p:cNvGraphicFramePr/>
           <p:nvPr/>
         </p:nvGraphicFramePr>
@@ -7572,7 +7588,7 @@
       </p:graphicFrame>
       <p:sp>
         <p:nvSpPr>
-          <p:cNvPr id="158" name="arrange(.data, …) Order rows by values of a column or columns (low to high), use with desc() to order from high to low.…"/>
+          <p:cNvPr id="159" name="arrange(.data, …) Order rows by values of a column or columns (low to high), use with desc() to order from high to low.…"/>
           <p:cNvSpPr txBox="1"/>
           <p:nvPr/>
         </p:nvSpPr>
@@ -7674,7 +7690,7 @@
       </p:sp>
       <p:sp>
         <p:nvSpPr>
-          <p:cNvPr id="159" name="add_row(.data, ..., .before = NULL, .after = NULL)…"/>
+          <p:cNvPr id="160" name="add_row(.data, ..., .before = NULL, .after = NULL)…"/>
           <p:cNvSpPr txBox="1"/>
           <p:nvPr/>
         </p:nvSpPr>
@@ -7766,13 +7782,13 @@
       </p:sp>
       <p:sp>
         <p:nvSpPr>
-          <p:cNvPr id="160" name="Group Cases"/>
+          <p:cNvPr id="161" name="Group Cases"/>
           <p:cNvSpPr txBox="1"/>
           <p:nvPr/>
         </p:nvSpPr>
         <p:spPr>
           <a:xfrm>
-            <a:off x="323328" y="6819751"/>
+            <a:off x="323328" y="6870551"/>
             <a:ext cx="1690371" cy="431801"/>
           </a:xfrm>
           <a:prstGeom prst="rect">
@@ -7814,7 +7830,7 @@
       </p:sp>
       <p:sp>
         <p:nvSpPr>
-          <p:cNvPr id="161" name="Manipulate Cases"/>
+          <p:cNvPr id="162" name="Manipulate Cases"/>
           <p:cNvSpPr txBox="1"/>
           <p:nvPr/>
         </p:nvSpPr>
@@ -7862,7 +7878,7 @@
       </p:sp>
       <p:sp>
         <p:nvSpPr>
-          <p:cNvPr id="162" name="EXTRACT VARIABLES"/>
+          <p:cNvPr id="163" name="EXTRACT VARIABLES"/>
           <p:cNvSpPr txBox="1"/>
           <p:nvPr/>
         </p:nvSpPr>
@@ -7898,7 +7914,7 @@
       </p:sp>
       <p:sp>
         <p:nvSpPr>
-          <p:cNvPr id="163" name="ADD CASES"/>
+          <p:cNvPr id="164" name="ADD CASES"/>
           <p:cNvSpPr txBox="1"/>
           <p:nvPr/>
         </p:nvSpPr>
@@ -7941,7 +7957,7 @@
       </p:sp>
       <p:sp>
         <p:nvSpPr>
-          <p:cNvPr id="164" name="ARRANGE CASES"/>
+          <p:cNvPr id="165" name="ARRANGE CASES"/>
           <p:cNvSpPr txBox="1"/>
           <p:nvPr/>
         </p:nvSpPr>
@@ -7977,7 +7993,7 @@
       </p:sp>
       <p:sp>
         <p:nvSpPr>
-          <p:cNvPr id="165" name="Logical and boolean operators to use with filter()"/>
+          <p:cNvPr id="166" name="Logical and boolean operators to use with filter()"/>
           <p:cNvSpPr txBox="1"/>
           <p:nvPr/>
         </p:nvSpPr>
@@ -8025,7 +8041,7 @@
       </p:sp>
       <p:sp>
         <p:nvSpPr>
-          <p:cNvPr id="166" name="Line"/>
+          <p:cNvPr id="167" name="Line"/>
           <p:cNvSpPr/>
           <p:nvPr/>
         </p:nvSpPr>
@@ -8068,7 +8084,7 @@
       </p:sp>
       <p:sp>
         <p:nvSpPr>
-          <p:cNvPr id="167" name="Line"/>
+          <p:cNvPr id="168" name="Line"/>
           <p:cNvSpPr/>
           <p:nvPr/>
         </p:nvSpPr>
@@ -8111,7 +8127,7 @@
       </p:sp>
       <p:sp>
         <p:nvSpPr>
-          <p:cNvPr id="168" name="Line"/>
+          <p:cNvPr id="169" name="Line"/>
           <p:cNvSpPr/>
           <p:nvPr/>
         </p:nvSpPr>
@@ -8154,14 +8170,14 @@
       </p:sp>
       <p:sp>
         <p:nvSpPr>
-          <p:cNvPr id="169" name="Column functions return a set of columns as a new table. Use a variant that ends in _ for non-standard evaluation friendly code."/>
+          <p:cNvPr id="170" name="Column functions return a set of columns as a new vector or table."/>
           <p:cNvSpPr txBox="1"/>
           <p:nvPr/>
         </p:nvSpPr>
         <p:spPr>
           <a:xfrm>
-            <a:off x="9401723" y="2320095"/>
-            <a:ext cx="4059428" cy="387049"/>
+            <a:off x="9424832" y="2320095"/>
+            <a:ext cx="4248620" cy="387049"/>
           </a:xfrm>
           <a:prstGeom prst="rect">
             <a:avLst/>
@@ -8197,20 +8213,20 @@
           <a:p>
             <a:pPr/>
             <a:r>
-              <a:t>Column functions return a set of columns as a new table. Use a variant that ends in _ for non-standard evaluation friendly code.</a:t>
+              <a:t>Column functions return a set of columns as a new vector or table.</a:t>
             </a:r>
           </a:p>
         </p:txBody>
       </p:sp>
       <p:grpSp>
         <p:nvGrpSpPr>
-          <p:cNvPr id="173" name="Group"/>
+          <p:cNvPr id="174" name="Group"/>
           <p:cNvGrpSpPr/>
           <p:nvPr/>
         </p:nvGrpSpPr>
         <p:grpSpPr>
           <a:xfrm>
-            <a:off x="9429362" y="3970227"/>
+            <a:off x="9424832" y="4478227"/>
             <a:ext cx="4046310" cy="636581"/>
             <a:chOff x="0" y="0"/>
             <a:chExt cx="4046308" cy="636580"/>
@@ -8218,7 +8234,7 @@
         </p:grpSpPr>
         <p:sp>
           <p:nvSpPr>
-            <p:cNvPr id="170" name="contains(match)…"/>
+            <p:cNvPr id="171" name="contains(match)…"/>
             <p:cNvSpPr txBox="1"/>
             <p:nvPr/>
           </p:nvSpPr>
@@ -8331,7 +8347,7 @@
         </p:sp>
         <p:sp>
           <p:nvSpPr>
-            <p:cNvPr id="171" name=":, e.g. mpg:cyl…"/>
+            <p:cNvPr id="172" name=":, e.g. mpg:cyl…"/>
             <p:cNvSpPr txBox="1"/>
             <p:nvPr/>
           </p:nvSpPr>
@@ -8408,7 +8424,7 @@
         </p:sp>
         <p:sp>
           <p:nvSpPr>
-            <p:cNvPr id="172" name="num_range(prefix, range)…"/>
+            <p:cNvPr id="173" name="num_range(prefix, range)…"/>
             <p:cNvSpPr txBox="1"/>
             <p:nvPr/>
           </p:nvSpPr>
@@ -8524,13 +8540,13 @@
       </p:grpSp>
       <p:sp>
         <p:nvSpPr>
-          <p:cNvPr id="174" name="select(.data, …)…"/>
+          <p:cNvPr id="175" name="pull(.data,  var = -1) Extract column values as a vector.  Choose by name or index.…"/>
           <p:cNvSpPr txBox="1"/>
           <p:nvPr/>
         </p:nvSpPr>
         <p:spPr>
           <a:xfrm>
-            <a:off x="10467445" y="2805494"/>
+            <a:off x="10467445" y="2691194"/>
             <a:ext cx="2912301" cy="634374"/>
           </a:xfrm>
           <a:prstGeom prst="rect">
@@ -8566,14 +8582,17 @@
             </a:pPr>
             <a:r>
               <a:rPr b="1"/>
-              <a:t>select(</a:t>
-            </a:r>
-            <a:r>
-              <a:t>.data, …</a:t>
+              <a:t>pull(</a:t>
+            </a:r>
+            <a:r>
+              <a:t>.data,  var = -1</a:t>
             </a:r>
             <a:r>
               <a:rPr b="1"/>
-              <a:t>)</a:t>
+              <a:t>) </a:t>
+            </a:r>
+            <a:r>
+              <a:t>Extract column values as a vector.  Choose by name or index.</a:t>
             </a:r>
           </a:p>
           <a:p>
@@ -8591,36 +8610,15 @@
               </a:defRPr>
             </a:pPr>
             <a:r>
-              <a:t>Extract columns by name. Also </a:t>
-            </a:r>
-            <a:r>
-              <a:rPr b="1"/>
-              <a:t>select_if()</a:t>
-            </a:r>
-          </a:p>
-          <a:p>
-            <a:pPr>
-              <a:lnSpc>
-                <a:spcPct val="80000"/>
-              </a:lnSpc>
-              <a:spcBef>
-                <a:spcPts val="0"/>
-              </a:spcBef>
-              <a:defRPr b="0" i="1">
-                <a:solidFill>
-                  <a:srgbClr val="000000"/>
-                </a:solidFill>
-              </a:defRPr>
-            </a:pPr>
-            <a:r>
-              <a:t>select(iris, Sepal.Length, Species)</a:t>
+              <a:rPr i="1"/>
+              <a:t>pull(iris, Sepal.Length)</a:t>
             </a:r>
           </a:p>
         </p:txBody>
       </p:sp>
       <p:sp>
         <p:nvSpPr>
-          <p:cNvPr id="175" name="Manipulate Variables"/>
+          <p:cNvPr id="176" name="Manipulate Variables"/>
           <p:cNvSpPr txBox="1"/>
           <p:nvPr/>
         </p:nvSpPr>
@@ -8668,14 +8666,14 @@
       </p:sp>
       <p:sp>
         <p:nvSpPr>
-          <p:cNvPr id="176" name="Use these helpers with select (),…"/>
+          <p:cNvPr id="177" name="Use these helpers with select (),…"/>
           <p:cNvSpPr txBox="1"/>
           <p:nvPr/>
         </p:nvSpPr>
         <p:spPr>
           <a:xfrm>
-            <a:off x="9409755" y="3553965"/>
-            <a:ext cx="2260702" cy="368301"/>
+            <a:off x="9424832" y="4061965"/>
+            <a:ext cx="2260703" cy="368301"/>
           </a:xfrm>
           <a:prstGeom prst="rect">
             <a:avLst/>
@@ -8734,13 +8732,13 @@
       </p:sp>
       <p:sp>
         <p:nvSpPr>
-          <p:cNvPr id="177" name="These apply vectorized functions to columns. Vectorized funs take vectors as input and return vectors of the same length as output (see back)."/>
+          <p:cNvPr id="178" name="These apply vectorized functions to columns. Vectorized funs take vectors as input and return vectors of the same length as output (see back)."/>
           <p:cNvSpPr txBox="1"/>
           <p:nvPr/>
         </p:nvSpPr>
         <p:spPr>
           <a:xfrm>
-            <a:off x="9424832" y="5003355"/>
+            <a:off x="9424832" y="5473255"/>
             <a:ext cx="4268448" cy="634373"/>
           </a:xfrm>
           <a:prstGeom prst="rect">
@@ -8789,14 +8787,14 @@
       </p:sp>
       <p:sp>
         <p:nvSpPr>
-          <p:cNvPr id="178" name="mutate(.data, …)  Compute new column(s).…"/>
+          <p:cNvPr id="179" name="mutate(.data, …)  Compute new column(s).…"/>
           <p:cNvSpPr txBox="1"/>
           <p:nvPr/>
         </p:nvSpPr>
         <p:spPr>
           <a:xfrm>
-            <a:off x="10467445" y="5809592"/>
-            <a:ext cx="2912301" cy="4357491"/>
+            <a:off x="10467445" y="6279492"/>
+            <a:ext cx="2912301" cy="3731842"/>
           </a:xfrm>
           <a:prstGeom prst="rect">
             <a:avLst/>
@@ -8963,12 +8961,39 @@
               <a:t>funs()</a:t>
             </a:r>
             <a:r>
-              <a:t>. </a:t>
+              <a:t>. Also </a:t>
+            </a:r>
+            <a:r>
+              <a:rPr b="1"/>
+              <a:t>mutate_if()</a:t>
+            </a:r>
+            <a:r>
+              <a:t>.</a:t>
             </a:r>
             <a:br/>
             <a:r>
               <a:rPr i="1"/>
               <a:t>mutate_all(faithful, funs(log(.), log2(.)))</a:t>
+            </a:r>
+            <a:endParaRPr i="1"/>
+          </a:p>
+          <a:p>
+            <a:pPr>
+              <a:lnSpc>
+                <a:spcPct val="80000"/>
+              </a:lnSpc>
+              <a:spcBef>
+                <a:spcPts val="0"/>
+              </a:spcBef>
+              <a:defRPr b="0">
+                <a:solidFill>
+                  <a:srgbClr val="000000"/>
+                </a:solidFill>
+              </a:defRPr>
+            </a:pPr>
+            <a:r>
+              <a:rPr i="1"/>
+              <a:t>mutate_if(iris, is.numeric, funs(log(.)))</a:t>
             </a:r>
           </a:p>
           <a:p>
@@ -9065,37 +9090,35 @@
             </a:pPr>
             <a:r>
               <a:rPr b="1"/>
-              <a:t>mutate_if(</a:t>
-            </a:r>
-            <a:r>
-              <a:t>.tbl, .predicate, .funs, …</a:t>
+              <a:t>add_column(</a:t>
+            </a:r>
+            <a:r>
+              <a:t>.data, ..., .before = NULL, .after = NULL</a:t>
             </a:r>
             <a:r>
               <a:rPr b="1"/>
               <a:t>)</a:t>
             </a:r>
             <a:r>
-              <a:t> </a:t>
-            </a:r>
-            <a:br/>
-            <a:r>
-              <a:t>Apply funs to all columns of one type. </a:t>
-            </a:r>
-            <a:br/>
-            <a:r>
-              <a:t>Use with </a:t>
+              <a:t> Add new column(s). Also </a:t>
             </a:r>
             <a:r>
               <a:rPr b="1"/>
-              <a:t>funs()</a:t>
-            </a:r>
-            <a:r>
-              <a:t>.</a:t>
-            </a:r>
-            <a:br/>
+              <a:t>add_count()</a:t>
+            </a:r>
+            <a:r>
+              <a:t>, </a:t>
+            </a:r>
+            <a:r>
+              <a:rPr b="1"/>
+              <a:t>add_tally()</a:t>
+            </a:r>
+            <a:r>
+              <a:t>. </a:t>
+            </a:r>
             <a:r>
               <a:rPr i="1"/>
-              <a:t>mutate_if(iris, is.numeric, funs(log(.)))</a:t>
+              <a:t>add_column(mtcars, new = 1:32)</a:t>
             </a:r>
           </a:p>
           <a:p>
@@ -9129,54 +9152,6 @@
             </a:pPr>
             <a:r>
               <a:rPr b="1"/>
-              <a:t>add_column(</a:t>
-            </a:r>
-            <a:r>
-              <a:t>.data, ..., .before = NULL, .after = NULL</a:t>
-            </a:r>
-            <a:r>
-              <a:rPr b="1"/>
-              <a:t>)</a:t>
-            </a:r>
-            <a:r>
-              <a:t> Add new column(s). </a:t>
-            </a:r>
-            <a:r>
-              <a:rPr i="1"/>
-              <a:t>add_column(mtcars, new = 1:32)</a:t>
-            </a:r>
-          </a:p>
-          <a:p>
-            <a:pPr>
-              <a:lnSpc>
-                <a:spcPct val="80000"/>
-              </a:lnSpc>
-              <a:spcBef>
-                <a:spcPts val="0"/>
-              </a:spcBef>
-              <a:defRPr b="0">
-                <a:solidFill>
-                  <a:srgbClr val="000000"/>
-                </a:solidFill>
-              </a:defRPr>
-            </a:pPr>
-          </a:p>
-          <a:p>
-            <a:pPr>
-              <a:lnSpc>
-                <a:spcPct val="80000"/>
-              </a:lnSpc>
-              <a:spcBef>
-                <a:spcPts val="0"/>
-              </a:spcBef>
-              <a:defRPr b="0">
-                <a:solidFill>
-                  <a:srgbClr val="000000"/>
-                </a:solidFill>
-              </a:defRPr>
-            </a:pPr>
-            <a:r>
-              <a:rPr b="1"/>
               <a:t>rename(</a:t>
             </a:r>
             <a:r>
@@ -9199,13 +9174,13 @@
       </p:sp>
       <p:sp>
         <p:nvSpPr>
-          <p:cNvPr id="179" name="MAKE NEW VARIABLES"/>
+          <p:cNvPr id="180" name="MAKE NEW VARIABLES"/>
           <p:cNvSpPr txBox="1"/>
           <p:nvPr/>
         </p:nvSpPr>
         <p:spPr>
           <a:xfrm>
-            <a:off x="9426688" y="4706232"/>
+            <a:off x="9426688" y="5176132"/>
             <a:ext cx="1523696" cy="215901"/>
           </a:xfrm>
           <a:prstGeom prst="rect">
@@ -9235,13 +9210,13 @@
       </p:sp>
       <p:sp>
         <p:nvSpPr>
-          <p:cNvPr id="180" name="Line"/>
+          <p:cNvPr id="181" name="Line"/>
           <p:cNvSpPr/>
           <p:nvPr/>
         </p:nvSpPr>
         <p:spPr>
           <a:xfrm>
-            <a:off x="9435669" y="4687560"/>
+            <a:off x="9435669" y="5157460"/>
             <a:ext cx="4246774" cy="1"/>
           </a:xfrm>
           <a:prstGeom prst="line">
@@ -9278,7 +9253,7 @@
       </p:sp>
       <p:sp>
         <p:nvSpPr>
-          <p:cNvPr id="181" name="EXTRACT CASES"/>
+          <p:cNvPr id="182" name="EXTRACT CASES"/>
           <p:cNvSpPr txBox="1"/>
           <p:nvPr/>
         </p:nvSpPr>
@@ -9314,7 +9289,7 @@
       </p:sp>
       <p:sp>
         <p:nvSpPr>
-          <p:cNvPr id="182" name="Line"/>
+          <p:cNvPr id="183" name="Line"/>
           <p:cNvSpPr/>
           <p:nvPr/>
         </p:nvSpPr>
@@ -9357,12 +9332,12 @@
       </p:sp>
       <p:graphicFrame>
         <p:nvGraphicFramePr>
-          <p:cNvPr id="183" name="Table"/>
+          <p:cNvPr id="184" name="Table"/>
           <p:cNvGraphicFramePr/>
           <p:nvPr/>
         </p:nvGraphicFramePr>
         <p:xfrm>
-          <a:off x="4829373" y="2827911"/>
+          <a:off x="4829373" y="2713611"/>
           <a:ext cx="381001" cy="609601"/>
         </p:xfrm>
         <a:graphic xmlns:a="http://schemas.openxmlformats.org/drawingml/2006/main">
@@ -9704,12 +9679,12 @@
       </p:graphicFrame>
       <p:graphicFrame>
         <p:nvGraphicFramePr>
-          <p:cNvPr id="184" name="Table"/>
+          <p:cNvPr id="185" name="Table"/>
           <p:cNvGraphicFramePr/>
           <p:nvPr/>
         </p:nvGraphicFramePr>
         <p:xfrm>
-          <a:off x="5388173" y="2830260"/>
+          <a:off x="5388173" y="2715960"/>
           <a:ext cx="650939" cy="609601"/>
         </p:xfrm>
         <a:graphic xmlns:a="http://schemas.openxmlformats.org/drawingml/2006/main">
@@ -9901,12 +9876,12 @@
       </p:graphicFrame>
       <p:graphicFrame>
         <p:nvGraphicFramePr>
-          <p:cNvPr id="185" name="Table"/>
+          <p:cNvPr id="186" name="Table"/>
           <p:cNvGraphicFramePr/>
           <p:nvPr/>
         </p:nvGraphicFramePr>
         <p:xfrm>
-          <a:off x="4829373" y="3492480"/>
+          <a:off x="4829373" y="3378180"/>
           <a:ext cx="381001" cy="685801"/>
         </p:xfrm>
         <a:graphic xmlns:a="http://schemas.openxmlformats.org/drawingml/2006/main">
@@ -10260,12 +10235,12 @@
       </p:graphicFrame>
       <p:graphicFrame>
         <p:nvGraphicFramePr>
-          <p:cNvPr id="186" name="Table"/>
+          <p:cNvPr id="187" name="Table"/>
           <p:cNvGraphicFramePr/>
           <p:nvPr/>
         </p:nvGraphicFramePr>
         <p:xfrm>
-          <a:off x="5388173" y="3494830"/>
+          <a:off x="5388173" y="3380530"/>
           <a:ext cx="650939" cy="609601"/>
         </p:xfrm>
         <a:graphic xmlns:a="http://schemas.openxmlformats.org/drawingml/2006/main">
@@ -10501,13 +10476,13 @@
       </p:graphicFrame>
       <p:sp>
         <p:nvSpPr>
-          <p:cNvPr id="187" name="Line"/>
+          <p:cNvPr id="188" name="Line"/>
           <p:cNvSpPr/>
           <p:nvPr/>
         </p:nvSpPr>
         <p:spPr>
           <a:xfrm>
-            <a:off x="5215587" y="3609130"/>
+            <a:off x="5215587" y="3494830"/>
             <a:ext cx="139605" cy="1"/>
           </a:xfrm>
           <a:prstGeom prst="line">
@@ -10554,12 +10529,12 @@
       </p:sp>
       <p:graphicFrame>
         <p:nvGraphicFramePr>
-          <p:cNvPr id="188" name="Table"/>
+          <p:cNvPr id="189" name="Table"/>
           <p:cNvGraphicFramePr/>
           <p:nvPr/>
         </p:nvGraphicFramePr>
         <p:xfrm>
-          <a:off x="4829373" y="4213063"/>
+          <a:off x="4829373" y="4098763"/>
           <a:ext cx="650939" cy="609601"/>
         </p:xfrm>
         <a:graphic xmlns:a="http://schemas.openxmlformats.org/drawingml/2006/main">
@@ -10913,12 +10888,12 @@
       </p:graphicFrame>
       <p:graphicFrame>
         <p:nvGraphicFramePr>
-          <p:cNvPr id="189" name="Table"/>
+          <p:cNvPr id="190" name="Table"/>
           <p:cNvGraphicFramePr/>
           <p:nvPr/>
         </p:nvGraphicFramePr>
         <p:xfrm>
-          <a:off x="5388173" y="4215412"/>
+          <a:off x="5388173" y="4101112"/>
           <a:ext cx="650939" cy="609601"/>
         </p:xfrm>
         <a:graphic xmlns:a="http://schemas.openxmlformats.org/drawingml/2006/main">
@@ -11166,13 +11141,13 @@
       </p:graphicFrame>
       <p:sp>
         <p:nvSpPr>
-          <p:cNvPr id="190" name="Line"/>
+          <p:cNvPr id="191" name="Line"/>
           <p:cNvSpPr/>
           <p:nvPr/>
         </p:nvSpPr>
         <p:spPr>
           <a:xfrm>
-            <a:off x="5215587" y="4329712"/>
+            <a:off x="5215587" y="4215412"/>
             <a:ext cx="139605" cy="1"/>
           </a:xfrm>
           <a:prstGeom prst="line">
@@ -11219,12 +11194,12 @@
       </p:sp>
       <p:graphicFrame>
         <p:nvGraphicFramePr>
-          <p:cNvPr id="191" name="Table"/>
+          <p:cNvPr id="192" name="Table"/>
           <p:cNvGraphicFramePr/>
           <p:nvPr/>
         </p:nvGraphicFramePr>
         <p:xfrm>
-          <a:off x="4829373" y="5475492"/>
+          <a:off x="4829373" y="5361192"/>
           <a:ext cx="650939" cy="609601"/>
         </p:xfrm>
         <a:graphic xmlns:a="http://schemas.openxmlformats.org/drawingml/2006/main">
@@ -11578,12 +11553,12 @@
       </p:graphicFrame>
       <p:graphicFrame>
         <p:nvGraphicFramePr>
-          <p:cNvPr id="192" name="Table"/>
+          <p:cNvPr id="193" name="Table"/>
           <p:cNvGraphicFramePr/>
           <p:nvPr/>
         </p:nvGraphicFramePr>
         <p:xfrm>
-          <a:off x="5388173" y="5477841"/>
+          <a:off x="5388173" y="5363541"/>
           <a:ext cx="650939" cy="609601"/>
         </p:xfrm>
         <a:graphic xmlns:a="http://schemas.openxmlformats.org/drawingml/2006/main">
@@ -11831,13 +11806,13 @@
       </p:graphicFrame>
       <p:sp>
         <p:nvSpPr>
-          <p:cNvPr id="193" name="Line"/>
+          <p:cNvPr id="194" name="Line"/>
           <p:cNvSpPr/>
           <p:nvPr/>
         </p:nvSpPr>
         <p:spPr>
           <a:xfrm>
-            <a:off x="5215587" y="5592141"/>
+            <a:off x="5215587" y="5477841"/>
             <a:ext cx="139605" cy="1"/>
           </a:xfrm>
           <a:prstGeom prst="line">
@@ -11884,7 +11859,7 @@
       </p:sp>
       <p:graphicFrame>
         <p:nvGraphicFramePr>
-          <p:cNvPr id="194" name="Table"/>
+          <p:cNvPr id="195" name="Table"/>
           <p:cNvGraphicFramePr/>
           <p:nvPr/>
         </p:nvGraphicFramePr>
@@ -12264,7 +12239,7 @@
       </p:graphicFrame>
       <p:graphicFrame>
         <p:nvGraphicFramePr>
-          <p:cNvPr id="195" name="Table"/>
+          <p:cNvPr id="196" name="Table"/>
           <p:cNvGraphicFramePr/>
           <p:nvPr/>
         </p:nvGraphicFramePr>
@@ -12644,7 +12619,7 @@
       </p:graphicFrame>
       <p:sp>
         <p:nvSpPr>
-          <p:cNvPr id="196" name="Line"/>
+          <p:cNvPr id="197" name="Line"/>
           <p:cNvSpPr/>
           <p:nvPr/>
         </p:nvSpPr>
@@ -12697,7 +12672,7 @@
       </p:sp>
       <p:graphicFrame>
         <p:nvGraphicFramePr>
-          <p:cNvPr id="197" name="Table"/>
+          <p:cNvPr id="198" name="Table"/>
           <p:cNvGraphicFramePr/>
           <p:nvPr/>
         </p:nvGraphicFramePr>
@@ -12979,7 +12954,7 @@
       </p:graphicFrame>
       <p:graphicFrame>
         <p:nvGraphicFramePr>
-          <p:cNvPr id="198" name="Table"/>
+          <p:cNvPr id="199" name="Table"/>
           <p:cNvGraphicFramePr/>
           <p:nvPr/>
         </p:nvGraphicFramePr>
@@ -13326,7 +13301,7 @@
       </p:graphicFrame>
       <p:sp>
         <p:nvSpPr>
-          <p:cNvPr id="199" name="Line"/>
+          <p:cNvPr id="200" name="Line"/>
           <p:cNvSpPr/>
           <p:nvPr/>
         </p:nvSpPr>
@@ -13379,12 +13354,12 @@
       </p:sp>
       <p:graphicFrame>
         <p:nvGraphicFramePr>
-          <p:cNvPr id="200" name="Table"/>
+          <p:cNvPr id="201" name="Table"/>
           <p:cNvGraphicFramePr/>
           <p:nvPr/>
         </p:nvGraphicFramePr>
         <p:xfrm>
-          <a:off x="9427123" y="2854012"/>
+          <a:off x="9427123" y="2739712"/>
           <a:ext cx="650939" cy="609601"/>
         </p:xfrm>
         <a:graphic xmlns:a="http://schemas.openxmlformats.org/drawingml/2006/main">
@@ -13673,12 +13648,12 @@
       </p:graphicFrame>
       <p:graphicFrame>
         <p:nvGraphicFramePr>
-          <p:cNvPr id="201" name="Table"/>
+          <p:cNvPr id="202" name="Table"/>
           <p:cNvGraphicFramePr/>
           <p:nvPr/>
         </p:nvGraphicFramePr>
         <p:xfrm>
-          <a:off x="9985923" y="2856361"/>
+          <a:off x="9985923" y="2742061"/>
           <a:ext cx="650939" cy="609601"/>
         </p:xfrm>
         <a:graphic xmlns:a="http://schemas.openxmlformats.org/drawingml/2006/main">
@@ -13718,9 +13693,7 @@
                     </a:p>
                   </a:txBody>
                   <a:tcPr marL="50800" marR="50800" marT="50800" marB="50800" anchor="ctr" anchorCtr="0" horzOverflow="overflow">
-                    <a:solidFill>
-                      <a:srgbClr val="A6AAA9"/>
-                    </a:solidFill>
+                    <a:noFill/>
                   </a:tcPr>
                 </a:tc>
               </a:tr>
@@ -13799,7 +13772,7 @@
       </p:graphicFrame>
       <p:sp>
         <p:nvSpPr>
-          <p:cNvPr id="202" name="Line"/>
+          <p:cNvPr id="203" name="Line"/>
           <p:cNvSpPr/>
           <p:nvPr/>
         </p:nvSpPr>
@@ -13852,7 +13825,7 @@
       </p:sp>
       <p:graphicFrame>
         <p:nvGraphicFramePr>
-          <p:cNvPr id="203" name="Table"/>
+          <p:cNvPr id="204" name="Table"/>
           <p:cNvGraphicFramePr/>
           <p:nvPr/>
         </p:nvGraphicFramePr>
@@ -14146,7 +14119,7 @@
       </p:graphicFrame>
       <p:graphicFrame>
         <p:nvGraphicFramePr>
-          <p:cNvPr id="204" name="Table"/>
+          <p:cNvPr id="205" name="Table"/>
           <p:cNvGraphicFramePr/>
           <p:nvPr/>
         </p:nvGraphicFramePr>
@@ -14429,7 +14402,7 @@
       </p:graphicFrame>
       <p:sp>
         <p:nvSpPr>
-          <p:cNvPr id="205" name="Line"/>
+          <p:cNvPr id="206" name="Line"/>
           <p:cNvSpPr/>
           <p:nvPr/>
         </p:nvSpPr>
@@ -14482,12 +14455,12 @@
       </p:sp>
       <p:graphicFrame>
         <p:nvGraphicFramePr>
-          <p:cNvPr id="206" name="Table"/>
+          <p:cNvPr id="207" name="Table"/>
           <p:cNvGraphicFramePr/>
           <p:nvPr/>
         </p:nvGraphicFramePr>
         <p:xfrm>
-          <a:off x="9427123" y="5858522"/>
+          <a:off x="9427123" y="6328422"/>
           <a:ext cx="650939" cy="609601"/>
         </p:xfrm>
         <a:graphic xmlns:a="http://schemas.openxmlformats.org/drawingml/2006/main">
@@ -14764,12 +14737,12 @@
       </p:graphicFrame>
       <p:graphicFrame>
         <p:nvGraphicFramePr>
-          <p:cNvPr id="207" name="Table"/>
+          <p:cNvPr id="208" name="Table"/>
           <p:cNvGraphicFramePr/>
           <p:nvPr/>
         </p:nvGraphicFramePr>
         <p:xfrm>
-          <a:off x="9960523" y="5860871"/>
+          <a:off x="9960523" y="6330771"/>
           <a:ext cx="650939" cy="609601"/>
         </p:xfrm>
         <a:graphic xmlns:a="http://schemas.openxmlformats.org/drawingml/2006/main">
@@ -15131,13 +15104,13 @@
       </p:graphicFrame>
       <p:sp>
         <p:nvSpPr>
-          <p:cNvPr id="208" name="Line"/>
+          <p:cNvPr id="209" name="Line"/>
           <p:cNvSpPr/>
           <p:nvPr/>
         </p:nvSpPr>
         <p:spPr>
           <a:xfrm>
-            <a:off x="9800637" y="5975171"/>
+            <a:off x="9800637" y="6445071"/>
             <a:ext cx="139605" cy="1"/>
           </a:xfrm>
           <a:prstGeom prst="line">
@@ -15184,12 +15157,12 @@
       </p:sp>
       <p:graphicFrame>
         <p:nvGraphicFramePr>
-          <p:cNvPr id="209" name="Table"/>
+          <p:cNvPr id="210" name="Table"/>
           <p:cNvGraphicFramePr/>
           <p:nvPr/>
         </p:nvGraphicFramePr>
         <p:xfrm>
-          <a:off x="9427123" y="6481206"/>
+          <a:off x="9427123" y="6951106"/>
           <a:ext cx="357982" cy="462757"/>
         </p:xfrm>
         <a:graphic xmlns:a="http://schemas.openxmlformats.org/drawingml/2006/main">
@@ -15466,12 +15439,12 @@
       </p:graphicFrame>
       <p:graphicFrame>
         <p:nvGraphicFramePr>
-          <p:cNvPr id="210" name="Table"/>
+          <p:cNvPr id="211" name="Table"/>
           <p:cNvGraphicFramePr/>
           <p:nvPr/>
         </p:nvGraphicFramePr>
         <p:xfrm>
-          <a:off x="9960523" y="6483555"/>
+          <a:off x="9960523" y="6953455"/>
           <a:ext cx="122238" cy="471489"/>
         </p:xfrm>
         <a:graphic xmlns:a="http://schemas.openxmlformats.org/drawingml/2006/main">
@@ -15581,13 +15554,13 @@
       </p:graphicFrame>
       <p:sp>
         <p:nvSpPr>
-          <p:cNvPr id="211" name="Line"/>
+          <p:cNvPr id="212" name="Line"/>
           <p:cNvSpPr/>
           <p:nvPr/>
         </p:nvSpPr>
         <p:spPr>
           <a:xfrm>
-            <a:off x="9800637" y="6597856"/>
+            <a:off x="9800637" y="7067756"/>
             <a:ext cx="139605" cy="1"/>
           </a:xfrm>
           <a:prstGeom prst="line">
@@ -15634,12 +15607,12 @@
       </p:sp>
       <p:graphicFrame>
         <p:nvGraphicFramePr>
-          <p:cNvPr id="212" name="Table"/>
+          <p:cNvPr id="213" name="Table"/>
           <p:cNvGraphicFramePr/>
           <p:nvPr/>
         </p:nvGraphicFramePr>
         <p:xfrm>
-          <a:off x="9427123" y="7079180"/>
+          <a:off x="9427123" y="7549080"/>
           <a:ext cx="650939" cy="609601"/>
         </p:xfrm>
         <a:graphic xmlns:a="http://schemas.openxmlformats.org/drawingml/2006/main">
@@ -15832,12 +15805,12 @@
       </p:graphicFrame>
       <p:graphicFrame>
         <p:nvGraphicFramePr>
-          <p:cNvPr id="213" name="Table"/>
+          <p:cNvPr id="214" name="Table"/>
           <p:cNvGraphicFramePr/>
           <p:nvPr/>
         </p:nvGraphicFramePr>
         <p:xfrm>
-          <a:off x="9858923" y="7081529"/>
+          <a:off x="9858923" y="7551429"/>
           <a:ext cx="650939" cy="609601"/>
         </p:xfrm>
         <a:graphic xmlns:a="http://schemas.openxmlformats.org/drawingml/2006/main">
@@ -16200,12 +16173,12 @@
       </p:graphicFrame>
       <p:graphicFrame>
         <p:nvGraphicFramePr>
-          <p:cNvPr id="214" name="Table"/>
+          <p:cNvPr id="215" name="Table"/>
           <p:cNvGraphicFramePr/>
           <p:nvPr/>
         </p:nvGraphicFramePr>
         <p:xfrm>
-          <a:off x="9439823" y="7707918"/>
+          <a:off x="9439823" y="8317518"/>
           <a:ext cx="650939" cy="609601"/>
         </p:xfrm>
         <a:graphic xmlns:a="http://schemas.openxmlformats.org/drawingml/2006/main">
@@ -16387,12 +16360,12 @@
       </p:graphicFrame>
       <p:graphicFrame>
         <p:nvGraphicFramePr>
-          <p:cNvPr id="215" name="Table"/>
+          <p:cNvPr id="216" name="Table"/>
           <p:cNvGraphicFramePr/>
           <p:nvPr/>
         </p:nvGraphicFramePr>
         <p:xfrm>
-          <a:off x="9858923" y="7710268"/>
+          <a:off x="9858923" y="8319868"/>
           <a:ext cx="650939" cy="609601"/>
         </p:xfrm>
         <a:graphic xmlns:a="http://schemas.openxmlformats.org/drawingml/2006/main">
@@ -16670,13 +16643,13 @@
       </p:graphicFrame>
       <p:sp>
         <p:nvSpPr>
-          <p:cNvPr id="216" name="Line"/>
+          <p:cNvPr id="217" name="Line"/>
           <p:cNvSpPr/>
           <p:nvPr/>
         </p:nvSpPr>
         <p:spPr>
           <a:xfrm>
-            <a:off x="9686337" y="7824568"/>
+            <a:off x="9686337" y="8434168"/>
             <a:ext cx="139605" cy="1"/>
           </a:xfrm>
           <a:prstGeom prst="line">
@@ -16723,7 +16696,7 @@
       </p:sp>
       <p:graphicFrame>
         <p:nvGraphicFramePr>
-          <p:cNvPr id="217" name="Table"/>
+          <p:cNvPr id="218" name="Table"/>
           <p:cNvGraphicFramePr/>
           <p:nvPr/>
         </p:nvGraphicFramePr>
@@ -17005,7 +16978,7 @@
       </p:graphicFrame>
       <p:graphicFrame>
         <p:nvGraphicFramePr>
-          <p:cNvPr id="218" name="Table"/>
+          <p:cNvPr id="219" name="Table"/>
           <p:cNvGraphicFramePr/>
           <p:nvPr/>
         </p:nvGraphicFramePr>
@@ -17372,7 +17345,7 @@
       </p:graphicFrame>
       <p:sp>
         <p:nvSpPr>
-          <p:cNvPr id="219" name="Line"/>
+          <p:cNvPr id="220" name="Line"/>
           <p:cNvSpPr/>
           <p:nvPr/>
         </p:nvSpPr>
@@ -17425,7 +17398,7 @@
       </p:sp>
       <p:sp>
         <p:nvSpPr>
-          <p:cNvPr id="220" name="Line"/>
+          <p:cNvPr id="221" name="Line"/>
           <p:cNvSpPr/>
           <p:nvPr/>
         </p:nvSpPr>
@@ -17466,7 +17439,7 @@
       </p:sp>
       <p:sp>
         <p:nvSpPr>
-          <p:cNvPr id="221" name="Line"/>
+          <p:cNvPr id="222" name="Line"/>
           <p:cNvSpPr/>
           <p:nvPr/>
         </p:nvSpPr>
@@ -17507,13 +17480,13 @@
       </p:sp>
       <p:sp>
         <p:nvSpPr>
-          <p:cNvPr id="222" name="Line"/>
+          <p:cNvPr id="223" name="Line"/>
           <p:cNvSpPr/>
           <p:nvPr/>
         </p:nvSpPr>
         <p:spPr>
           <a:xfrm>
-            <a:off x="323328" y="6860432"/>
+            <a:off x="323328" y="6911232"/>
             <a:ext cx="4140391" cy="1"/>
           </a:xfrm>
           <a:prstGeom prst="line">
@@ -17548,14 +17521,14 @@
       </p:sp>
       <p:pic>
         <p:nvPicPr>
-          <p:cNvPr id="223" name="Image" descr="Image"/>
+          <p:cNvPr id="224" name="Image" descr="Image"/>
           <p:cNvPicPr>
             <a:picLocks noChangeAspect="1"/>
           </p:cNvPicPr>
           <p:nvPr/>
         </p:nvPicPr>
         <p:blipFill>
-          <a:blip r:embed="rId7">
+          <a:blip r:embed="rId8">
             <a:extLst/>
           </a:blip>
           <a:stretch>
@@ -17577,14 +17550,14 @@
       </p:pic>
       <p:pic>
         <p:nvPicPr>
-          <p:cNvPr id="224" name="Image" descr="Image"/>
+          <p:cNvPr id="225" name="Image" descr="Image"/>
           <p:cNvPicPr>
             <a:picLocks noChangeAspect="1"/>
           </p:cNvPicPr>
           <p:nvPr/>
         </p:nvPicPr>
         <p:blipFill>
-          <a:blip r:embed="rId8">
+          <a:blip r:embed="rId9">
             <a:extLst/>
           </a:blip>
           <a:stretch>
@@ -17593,7 +17566,7 @@
         </p:blipFill>
         <p:spPr>
           <a:xfrm>
-            <a:off x="1600589" y="3952769"/>
+            <a:off x="1600589" y="4105169"/>
             <a:ext cx="2483944" cy="276125"/>
           </a:xfrm>
           <a:prstGeom prst="rect">
@@ -17606,13 +17579,13 @@
       </p:pic>
       <p:sp>
         <p:nvSpPr>
-          <p:cNvPr id="225" name="summary function"/>
+          <p:cNvPr id="226" name="summary function"/>
           <p:cNvSpPr txBox="1"/>
           <p:nvPr/>
         </p:nvSpPr>
         <p:spPr>
           <a:xfrm>
-            <a:off x="1769801" y="3989753"/>
+            <a:off x="1769801" y="4142153"/>
             <a:ext cx="1247446" cy="190501"/>
           </a:xfrm>
           <a:prstGeom prst="rect">
@@ -17656,14 +17629,14 @@
       </p:sp>
       <p:pic>
         <p:nvPicPr>
-          <p:cNvPr id="226" name="Image" descr="Image"/>
+          <p:cNvPr id="227" name="Image" descr="Image"/>
           <p:cNvPicPr>
             <a:picLocks noChangeAspect="1"/>
           </p:cNvPicPr>
           <p:nvPr/>
         </p:nvPicPr>
         <p:blipFill>
-          <a:blip r:embed="rId9">
+          <a:blip r:embed="rId10">
             <a:extLst/>
           </a:blip>
           <a:stretch>
@@ -17672,7 +17645,7 @@
         </p:blipFill>
         <p:spPr>
           <a:xfrm>
-            <a:off x="11087961" y="5445274"/>
+            <a:off x="11087961" y="5915174"/>
             <a:ext cx="2483944" cy="276231"/>
           </a:xfrm>
           <a:prstGeom prst="rect">
@@ -17685,13 +17658,13 @@
       </p:pic>
       <p:sp>
         <p:nvSpPr>
-          <p:cNvPr id="227" name="vectorized function"/>
+          <p:cNvPr id="228" name="vectorized function"/>
           <p:cNvSpPr txBox="1"/>
           <p:nvPr/>
         </p:nvSpPr>
         <p:spPr>
           <a:xfrm>
-            <a:off x="11214924" y="5475439"/>
+            <a:off x="11214924" y="5945339"/>
             <a:ext cx="1315569" cy="190501"/>
           </a:xfrm>
           <a:prstGeom prst="rect">
@@ -17735,35 +17708,6 @@
       </p:sp>
       <p:pic>
         <p:nvPicPr>
-          <p:cNvPr id="228" name="Image" descr="Image"/>
-          <p:cNvPicPr>
-            <a:picLocks noChangeAspect="1"/>
-          </p:cNvPicPr>
-          <p:nvPr/>
-        </p:nvPicPr>
-        <p:blipFill>
-          <a:blip r:embed="rId10">
-            <a:extLst/>
-          </a:blip>
-          <a:stretch>
-            <a:fillRect/>
-          </a:stretch>
-        </p:blipFill>
-        <p:spPr>
-          <a:xfrm>
-            <a:off x="8369105" y="-684523"/>
-            <a:ext cx="5603817" cy="2992964"/>
-          </a:xfrm>
-          <a:prstGeom prst="rect">
-            <a:avLst/>
-          </a:prstGeom>
-          <a:ln w="12700">
-            <a:miter lim="400000"/>
-          </a:ln>
-        </p:spPr>
-      </p:pic>
-      <p:pic>
-        <p:nvPicPr>
           <p:cNvPr id="229" name="Image" descr="Image"/>
           <p:cNvPicPr>
             <a:picLocks noChangeAspect="1"/>
@@ -17771,7 +17715,7 @@
           <p:nvPr/>
         </p:nvPicPr>
         <p:blipFill>
-          <a:blip r:embed="rId7">
+          <a:blip r:embed="rId8">
             <a:extLst/>
           </a:blip>
           <a:stretch>
@@ -18961,7 +18905,7 @@
         </p:nvSpPr>
         <p:spPr>
           <a:xfrm>
-            <a:off x="5215587" y="2970661"/>
+            <a:off x="5215587" y="2856361"/>
             <a:ext cx="139605" cy="1"/>
           </a:xfrm>
           <a:prstGeom prst="line">
@@ -19014,8 +18958,570 @@
         </p:nvSpPr>
         <p:spPr>
           <a:xfrm>
-            <a:off x="9686337" y="7243720"/>
+            <a:off x="9686337" y="7713620"/>
             <a:ext cx="139605" cy="1"/>
+          </a:xfrm>
+          <a:prstGeom prst="line">
+            <a:avLst/>
+          </a:prstGeom>
+          <a:ln w="12700">
+            <a:solidFill>
+              <a:srgbClr val="53585F"/>
+            </a:solidFill>
+            <a:miter lim="400000"/>
+            <a:tailEnd type="triangle"/>
+          </a:ln>
+        </p:spPr>
+        <p:txBody>
+          <a:bodyPr lIns="0" tIns="0" rIns="0" bIns="0"/>
+          <a:lstStyle/>
+          <a:p>
+            <a:pPr>
+              <a:lnSpc>
+                <a:spcPct val="80000"/>
+              </a:lnSpc>
+              <a:spcBef>
+                <a:spcPts val="0"/>
+              </a:spcBef>
+              <a:defRPr b="0" sz="5600">
+                <a:solidFill>
+                  <a:srgbClr val="000000"/>
+                </a:solidFill>
+                <a:effectLst>
+                  <a:outerShdw sx="100000" sy="100000" kx="0" ky="0" algn="b" rotWithShape="0" blurRad="38100" dist="12700" dir="5400000">
+                    <a:srgbClr val="000000">
+                      <a:alpha val="50000"/>
+                    </a:srgbClr>
+                  </a:outerShdw>
+                </a:effectLst>
+                <a:latin typeface="Gill Sans"/>
+                <a:ea typeface="Gill Sans"/>
+                <a:cs typeface="Gill Sans"/>
+                <a:sym typeface="Gill Sans"/>
+              </a:defRPr>
+            </a:pPr>
+          </a:p>
+        </p:txBody>
+      </p:sp>
+      <p:sp>
+        <p:nvSpPr>
+          <p:cNvPr id="243" name="select(.data, …)…"/>
+          <p:cNvSpPr txBox="1"/>
+          <p:nvPr/>
+        </p:nvSpPr>
+        <p:spPr>
+          <a:xfrm>
+            <a:off x="10465155" y="3311057"/>
+            <a:ext cx="2912300" cy="609198"/>
+          </a:xfrm>
+          <a:prstGeom prst="rect">
+            <a:avLst/>
+          </a:prstGeom>
+          <a:ln w="12700">
+            <a:miter lim="400000"/>
+          </a:ln>
+          <a:extLst>
+            <a:ext uri="{C572A759-6A51-4108-AA02-DFA0A04FC94B}">
+              <ma14:wrappingTextBoxFlag xmlns:ma14="http://schemas.microsoft.com/office/mac/drawingml/2011/main" val="1"/>
+            </a:ext>
+          </a:extLst>
+        </p:spPr>
+        <p:txBody>
+          <a:bodyPr lIns="0" tIns="0" rIns="0" bIns="0">
+            <a:normAutofit fontScale="100000" lnSpcReduction="0"/>
+          </a:bodyPr>
+          <a:lstStyle/>
+          <a:p>
+            <a:pPr>
+              <a:lnSpc>
+                <a:spcPct val="80000"/>
+              </a:lnSpc>
+              <a:spcBef>
+                <a:spcPts val="0"/>
+              </a:spcBef>
+              <a:defRPr b="0">
+                <a:solidFill>
+                  <a:srgbClr val="000000"/>
+                </a:solidFill>
+              </a:defRPr>
+            </a:pPr>
+            <a:r>
+              <a:rPr b="1"/>
+              <a:t>select(</a:t>
+            </a:r>
+            <a:r>
+              <a:t>.data, …</a:t>
+            </a:r>
+            <a:r>
+              <a:rPr b="1"/>
+              <a:t>)</a:t>
+            </a:r>
+          </a:p>
+          <a:p>
+            <a:pPr>
+              <a:lnSpc>
+                <a:spcPct val="80000"/>
+              </a:lnSpc>
+              <a:spcBef>
+                <a:spcPts val="0"/>
+              </a:spcBef>
+              <a:defRPr b="0">
+                <a:solidFill>
+                  <a:srgbClr val="000000"/>
+                </a:solidFill>
+              </a:defRPr>
+            </a:pPr>
+            <a:r>
+              <a:t>Extract columns as a table. Also </a:t>
+            </a:r>
+            <a:r>
+              <a:rPr b="1"/>
+              <a:t>select_if()</a:t>
+            </a:r>
+            <a:r>
+              <a:t>.</a:t>
+            </a:r>
+            <a:r>
+              <a:rPr b="1"/>
+              <a:t> </a:t>
+            </a:r>
+            <a:r>
+              <a:rPr i="1"/>
+              <a:t>select(iris, Sepal.Length, Species)</a:t>
+            </a:r>
+          </a:p>
+        </p:txBody>
+      </p:sp>
+      <p:graphicFrame>
+        <p:nvGraphicFramePr>
+          <p:cNvPr id="244" name="Table"/>
+          <p:cNvGraphicFramePr/>
+          <p:nvPr/>
+        </p:nvGraphicFramePr>
+        <p:xfrm>
+          <a:off x="9424832" y="3359575"/>
+          <a:ext cx="650940" cy="609601"/>
+        </p:xfrm>
+        <a:graphic xmlns:a="http://schemas.openxmlformats.org/drawingml/2006/main">
+          <a:graphicData uri="http://schemas.openxmlformats.org/drawingml/2006/table">
+            <a:tbl>
+              <a:tblPr firstCol="0" firstRow="1" lastCol="0" lastRow="0" bandCol="0" bandRow="0" rtl="0">
+                <a:tableStyleId>{33BA23B1-9221-436E-865A-0063620EA4FD}</a:tableStyleId>
+              </a:tblPr>
+              <a:tblGrid>
+                <a:gridCol w="114300"/>
+                <a:gridCol w="114300"/>
+                <a:gridCol w="114300"/>
+              </a:tblGrid>
+              <a:tr h="114300">
+                <a:tc>
+                  <a:txBody>
+                    <a:bodyPr/>
+                    <a:lstStyle/>
+                    <a:p>
+                      <a:pPr defTabSz="914400">
+                        <a:defRPr b="0">
+                          <a:solidFill>
+                            <a:srgbClr val="000000"/>
+                          </a:solidFill>
+                        </a:defRPr>
+                      </a:pPr>
+                      <a:r>
+                        <a:rPr b="1" sz="3600">
+                          <a:solidFill>
+                            <a:srgbClr val="FFFFFF"/>
+                          </a:solidFill>
+                          <a:latin typeface="Helvetica"/>
+                          <a:ea typeface="Helvetica"/>
+                          <a:cs typeface="Helvetica"/>
+                          <a:sym typeface="Helvetica"/>
+                        </a:rPr>
+                        <a:t>wind</a:t>
+                      </a:r>
+                    </a:p>
+                  </a:txBody>
+                  <a:tcPr marL="50800" marR="50800" marT="50800" marB="50800" anchor="ctr" anchorCtr="0" horzOverflow="overflow">
+                    <a:solidFill>
+                      <a:srgbClr val="A6AAA9"/>
+                    </a:solidFill>
+                  </a:tcPr>
+                </a:tc>
+                <a:tc>
+                  <a:txBody>
+                    <a:bodyPr/>
+                    <a:lstStyle/>
+                    <a:p>
+                      <a:pPr defTabSz="914400">
+                        <a:defRPr b="0">
+                          <a:solidFill>
+                            <a:srgbClr val="000000"/>
+                          </a:solidFill>
+                        </a:defRPr>
+                      </a:pPr>
+                      <a:r>
+                        <a:rPr b="1" sz="3600">
+                          <a:solidFill>
+                            <a:srgbClr val="FFFFFF"/>
+                          </a:solidFill>
+                          <a:latin typeface="Helvetica"/>
+                          <a:ea typeface="Helvetica"/>
+                          <a:cs typeface="Helvetica"/>
+                          <a:sym typeface="Helvetica"/>
+                        </a:rPr>
+                        <a:t>wind</a:t>
+                      </a:r>
+                    </a:p>
+                  </a:txBody>
+                  <a:tcPr marL="50800" marR="50800" marT="50800" marB="50800" anchor="ctr" anchorCtr="0" horzOverflow="overflow">
+                    <a:solidFill>
+                      <a:srgbClr val="A6AAA9"/>
+                    </a:solidFill>
+                  </a:tcPr>
+                </a:tc>
+                <a:tc>
+                  <a:txBody>
+                    <a:bodyPr/>
+                    <a:lstStyle/>
+                    <a:p>
+                      <a:pPr defTabSz="914400">
+                        <a:defRPr b="0">
+                          <a:solidFill>
+                            <a:srgbClr val="000000"/>
+                          </a:solidFill>
+                        </a:defRPr>
+                      </a:pPr>
+                      <a:r>
+                        <a:rPr b="1" sz="3600">
+                          <a:solidFill>
+                            <a:srgbClr val="FFFFFF"/>
+                          </a:solidFill>
+                          <a:latin typeface="Helvetica"/>
+                          <a:ea typeface="Helvetica"/>
+                          <a:cs typeface="Helvetica"/>
+                          <a:sym typeface="Helvetica"/>
+                        </a:rPr>
+                        <a:t>wind</a:t>
+                      </a:r>
+                    </a:p>
+                  </a:txBody>
+                  <a:tcPr marL="50800" marR="50800" marT="50800" marB="50800" anchor="ctr" anchorCtr="0" horzOverflow="overflow">
+                    <a:solidFill>
+                      <a:srgbClr val="A6AAA9"/>
+                    </a:solidFill>
+                  </a:tcPr>
+                </a:tc>
+              </a:tr>
+              <a:tr h="114300">
+                <a:tc>
+                  <a:txBody>
+                    <a:bodyPr/>
+                    <a:lstStyle/>
+                    <a:p>
+                      <a:pPr defTabSz="914400">
+                        <a:defRPr sz="1000">
+                          <a:latin typeface="Helvetica"/>
+                          <a:ea typeface="Helvetica"/>
+                          <a:cs typeface="Helvetica"/>
+                          <a:sym typeface="Helvetica"/>
+                        </a:defRPr>
+                      </a:pPr>
+                    </a:p>
+                  </a:txBody>
+                  <a:tcPr marL="0" marR="0" marT="0" marB="0" anchor="ctr" anchorCtr="0" horzOverflow="overflow">
+                    <a:solidFill>
+                      <a:srgbClr val="FABF53"/>
+                    </a:solidFill>
+                  </a:tcPr>
+                </a:tc>
+                <a:tc>
+                  <a:txBody>
+                    <a:bodyPr/>
+                    <a:lstStyle/>
+                    <a:p>
+                      <a:pPr defTabSz="914400">
+                        <a:defRPr sz="1000">
+                          <a:latin typeface="Helvetica"/>
+                          <a:ea typeface="Helvetica"/>
+                          <a:cs typeface="Helvetica"/>
+                          <a:sym typeface="Helvetica"/>
+                        </a:defRPr>
+                      </a:pPr>
+                    </a:p>
+                  </a:txBody>
+                  <a:tcPr marL="0" marR="0" marT="0" marB="0" anchor="ctr" anchorCtr="0" horzOverflow="overflow"/>
+                </a:tc>
+                <a:tc>
+                  <a:txBody>
+                    <a:bodyPr/>
+                    <a:lstStyle/>
+                    <a:p>
+                      <a:pPr defTabSz="914400">
+                        <a:defRPr sz="1000">
+                          <a:latin typeface="Helvetica"/>
+                          <a:ea typeface="Helvetica"/>
+                          <a:cs typeface="Helvetica"/>
+                          <a:sym typeface="Helvetica"/>
+                        </a:defRPr>
+                      </a:pPr>
+                    </a:p>
+                  </a:txBody>
+                  <a:tcPr marL="0" marR="0" marT="0" marB="0" anchor="ctr" anchorCtr="0" horzOverflow="overflow"/>
+                </a:tc>
+              </a:tr>
+              <a:tr h="114300">
+                <a:tc>
+                  <a:txBody>
+                    <a:bodyPr/>
+                    <a:lstStyle/>
+                    <a:p>
+                      <a:pPr defTabSz="914400">
+                        <a:defRPr sz="1000">
+                          <a:latin typeface="Helvetica"/>
+                          <a:ea typeface="Helvetica"/>
+                          <a:cs typeface="Helvetica"/>
+                          <a:sym typeface="Helvetica"/>
+                        </a:defRPr>
+                      </a:pPr>
+                    </a:p>
+                  </a:txBody>
+                  <a:tcPr marL="0" marR="0" marT="0" marB="0" anchor="ctr" anchorCtr="0" horzOverflow="overflow">
+                    <a:solidFill>
+                      <a:srgbClr val="FABF53"/>
+                    </a:solidFill>
+                  </a:tcPr>
+                </a:tc>
+                <a:tc>
+                  <a:txBody>
+                    <a:bodyPr/>
+                    <a:lstStyle/>
+                    <a:p>
+                      <a:pPr defTabSz="914400">
+                        <a:defRPr sz="1000">
+                          <a:latin typeface="Helvetica"/>
+                          <a:ea typeface="Helvetica"/>
+                          <a:cs typeface="Helvetica"/>
+                          <a:sym typeface="Helvetica"/>
+                        </a:defRPr>
+                      </a:pPr>
+                    </a:p>
+                  </a:txBody>
+                  <a:tcPr marL="0" marR="0" marT="0" marB="0" anchor="ctr" anchorCtr="0" horzOverflow="overflow"/>
+                </a:tc>
+                <a:tc>
+                  <a:txBody>
+                    <a:bodyPr/>
+                    <a:lstStyle/>
+                    <a:p>
+                      <a:pPr defTabSz="914400">
+                        <a:defRPr sz="1000">
+                          <a:latin typeface="Helvetica"/>
+                          <a:ea typeface="Helvetica"/>
+                          <a:cs typeface="Helvetica"/>
+                          <a:sym typeface="Helvetica"/>
+                        </a:defRPr>
+                      </a:pPr>
+                    </a:p>
+                  </a:txBody>
+                  <a:tcPr marL="0" marR="0" marT="0" marB="0" anchor="ctr" anchorCtr="0" horzOverflow="overflow"/>
+                </a:tc>
+              </a:tr>
+              <a:tr h="114300">
+                <a:tc>
+                  <a:txBody>
+                    <a:bodyPr/>
+                    <a:lstStyle/>
+                    <a:p>
+                      <a:pPr defTabSz="914400">
+                        <a:defRPr sz="1000">
+                          <a:latin typeface="Helvetica"/>
+                          <a:ea typeface="Helvetica"/>
+                          <a:cs typeface="Helvetica"/>
+                          <a:sym typeface="Helvetica"/>
+                        </a:defRPr>
+                      </a:pPr>
+                    </a:p>
+                  </a:txBody>
+                  <a:tcPr marL="0" marR="0" marT="0" marB="0" anchor="ctr" anchorCtr="0" horzOverflow="overflow">
+                    <a:solidFill>
+                      <a:srgbClr val="FABF53"/>
+                    </a:solidFill>
+                  </a:tcPr>
+                </a:tc>
+                <a:tc>
+                  <a:txBody>
+                    <a:bodyPr/>
+                    <a:lstStyle/>
+                    <a:p>
+                      <a:pPr defTabSz="914400">
+                        <a:defRPr sz="1000">
+                          <a:latin typeface="Helvetica"/>
+                          <a:ea typeface="Helvetica"/>
+                          <a:cs typeface="Helvetica"/>
+                          <a:sym typeface="Helvetica"/>
+                        </a:defRPr>
+                      </a:pPr>
+                    </a:p>
+                  </a:txBody>
+                  <a:tcPr marL="0" marR="0" marT="0" marB="0" anchor="ctr" anchorCtr="0" horzOverflow="overflow"/>
+                </a:tc>
+                <a:tc>
+                  <a:txBody>
+                    <a:bodyPr/>
+                    <a:lstStyle/>
+                    <a:p>
+                      <a:pPr defTabSz="914400">
+                        <a:defRPr sz="1000">
+                          <a:latin typeface="Helvetica"/>
+                          <a:ea typeface="Helvetica"/>
+                          <a:cs typeface="Helvetica"/>
+                          <a:sym typeface="Helvetica"/>
+                        </a:defRPr>
+                      </a:pPr>
+                    </a:p>
+                  </a:txBody>
+                  <a:tcPr marL="0" marR="0" marT="0" marB="0" anchor="ctr" anchorCtr="0" horzOverflow="overflow"/>
+                </a:tc>
+              </a:tr>
+            </a:tbl>
+          </a:graphicData>
+        </a:graphic>
+      </p:graphicFrame>
+      <p:graphicFrame>
+        <p:nvGraphicFramePr>
+          <p:cNvPr id="245" name="Table"/>
+          <p:cNvGraphicFramePr/>
+          <p:nvPr/>
+        </p:nvGraphicFramePr>
+        <p:xfrm>
+          <a:off x="9983632" y="3361924"/>
+          <a:ext cx="650940" cy="609601"/>
+        </p:xfrm>
+        <a:graphic xmlns:a="http://schemas.openxmlformats.org/drawingml/2006/main">
+          <a:graphicData uri="http://schemas.openxmlformats.org/drawingml/2006/table">
+            <a:tbl>
+              <a:tblPr firstCol="0" firstRow="1" lastCol="0" lastRow="0" bandCol="0" bandRow="0" rtl="0">
+                <a:tableStyleId>{33BA23B1-9221-436E-865A-0063620EA4FD}</a:tableStyleId>
+              </a:tblPr>
+              <a:tblGrid>
+                <a:gridCol w="114300"/>
+              </a:tblGrid>
+              <a:tr h="114300">
+                <a:tc>
+                  <a:txBody>
+                    <a:bodyPr/>
+                    <a:lstStyle/>
+                    <a:p>
+                      <a:pPr defTabSz="914400">
+                        <a:defRPr b="0">
+                          <a:solidFill>
+                            <a:srgbClr val="000000"/>
+                          </a:solidFill>
+                        </a:defRPr>
+                      </a:pPr>
+                      <a:r>
+                        <a:rPr b="1" sz="3600">
+                          <a:solidFill>
+                            <a:srgbClr val="FFFFFF"/>
+                          </a:solidFill>
+                          <a:latin typeface="Helvetica"/>
+                          <a:ea typeface="Helvetica"/>
+                          <a:cs typeface="Helvetica"/>
+                          <a:sym typeface="Helvetica"/>
+                        </a:rPr>
+                        <a:t>wind</a:t>
+                      </a:r>
+                    </a:p>
+                  </a:txBody>
+                  <a:tcPr marL="50800" marR="50800" marT="50800" marB="50800" anchor="ctr" anchorCtr="0" horzOverflow="overflow">
+                    <a:solidFill>
+                      <a:srgbClr val="A6AAA9"/>
+                    </a:solidFill>
+                  </a:tcPr>
+                </a:tc>
+              </a:tr>
+              <a:tr h="114300">
+                <a:tc>
+                  <a:txBody>
+                    <a:bodyPr/>
+                    <a:lstStyle/>
+                    <a:p>
+                      <a:pPr defTabSz="914400">
+                        <a:defRPr sz="1000">
+                          <a:latin typeface="Helvetica"/>
+                          <a:ea typeface="Helvetica"/>
+                          <a:cs typeface="Helvetica"/>
+                          <a:sym typeface="Helvetica"/>
+                        </a:defRPr>
+                      </a:pPr>
+                    </a:p>
+                  </a:txBody>
+                  <a:tcPr marL="0" marR="0" marT="0" marB="0" anchor="ctr" anchorCtr="0" horzOverflow="overflow">
+                    <a:solidFill>
+                      <a:srgbClr val="FABF53"/>
+                    </a:solidFill>
+                  </a:tcPr>
+                </a:tc>
+              </a:tr>
+              <a:tr h="114300">
+                <a:tc>
+                  <a:txBody>
+                    <a:bodyPr/>
+                    <a:lstStyle/>
+                    <a:p>
+                      <a:pPr defTabSz="914400">
+                        <a:defRPr sz="1000">
+                          <a:latin typeface="Helvetica"/>
+                          <a:ea typeface="Helvetica"/>
+                          <a:cs typeface="Helvetica"/>
+                          <a:sym typeface="Helvetica"/>
+                        </a:defRPr>
+                      </a:pPr>
+                    </a:p>
+                  </a:txBody>
+                  <a:tcPr marL="0" marR="0" marT="0" marB="0" anchor="ctr" anchorCtr="0" horzOverflow="overflow">
+                    <a:solidFill>
+                      <a:srgbClr val="FABF53"/>
+                    </a:solidFill>
+                  </a:tcPr>
+                </a:tc>
+              </a:tr>
+              <a:tr h="114300">
+                <a:tc>
+                  <a:txBody>
+                    <a:bodyPr/>
+                    <a:lstStyle/>
+                    <a:p>
+                      <a:pPr defTabSz="914400">
+                        <a:defRPr sz="1000">
+                          <a:latin typeface="Helvetica"/>
+                          <a:ea typeface="Helvetica"/>
+                          <a:cs typeface="Helvetica"/>
+                          <a:sym typeface="Helvetica"/>
+                        </a:defRPr>
+                      </a:pPr>
+                    </a:p>
+                  </a:txBody>
+                  <a:tcPr marL="0" marR="0" marT="0" marB="0" anchor="ctr" anchorCtr="0" horzOverflow="overflow">
+                    <a:solidFill>
+                      <a:srgbClr val="FABF53"/>
+                    </a:solidFill>
+                  </a:tcPr>
+                </a:tc>
+              </a:tr>
+            </a:tbl>
+          </a:graphicData>
+        </a:graphic>
+      </p:graphicFrame>
+      <p:sp>
+        <p:nvSpPr>
+          <p:cNvPr id="246" name="Line"/>
+          <p:cNvSpPr/>
+          <p:nvPr/>
+        </p:nvSpPr>
+        <p:spPr>
+          <a:xfrm>
+            <a:off x="9811046" y="3577824"/>
+            <a:ext cx="139606" cy="1"/>
           </a:xfrm>
           <a:prstGeom prst="line">
             <a:avLst/>
@@ -19087,7 +19593,7 @@
       </p:grpSpPr>
       <p:pic>
         <p:nvPicPr>
-          <p:cNvPr id="244" name="Image" descr="Image"/>
+          <p:cNvPr id="248" name="Image" descr="Image"/>
           <p:cNvPicPr>
             <a:picLocks noChangeAspect="1"/>
           </p:cNvPicPr>
@@ -19116,7 +19622,7 @@
       </p:pic>
       <p:pic>
         <p:nvPicPr>
-          <p:cNvPr id="245" name="Image" descr="Image"/>
+          <p:cNvPr id="249" name="Image" descr="Image"/>
           <p:cNvPicPr>
             <a:picLocks noChangeAspect="1"/>
           </p:cNvPicPr>
@@ -19145,7 +19651,7 @@
       </p:pic>
       <p:pic>
         <p:nvPicPr>
-          <p:cNvPr id="246" name="Image" descr="Image"/>
+          <p:cNvPr id="250" name="Image" descr="Image"/>
           <p:cNvPicPr>
             <a:picLocks noChangeAspect="1"/>
           </p:cNvPicPr>
@@ -19174,7 +19680,7 @@
       </p:pic>
       <p:sp>
         <p:nvSpPr>
-          <p:cNvPr id="247" name="OFFSETS…"/>
+          <p:cNvPr id="251" name="OFFSETS…"/>
           <p:cNvSpPr txBox="1"/>
           <p:nvPr/>
         </p:nvSpPr>
@@ -19342,9 +19848,6 @@
               </a:defRPr>
             </a:pPr>
             <a:r>
-              <a:t>             </a:t>
-            </a:r>
-            <a:r>
               <a:rPr b="1"/>
               <a:t>cummax()</a:t>
             </a:r>
@@ -19392,9 +19895,6 @@
               </a:defRPr>
             </a:pPr>
             <a:r>
-              <a:t>             </a:t>
-            </a:r>
-            <a:r>
               <a:rPr b="1"/>
               <a:t>cummin()</a:t>
             </a:r>
@@ -19417,9 +19917,6 @@
               </a:defRPr>
             </a:pPr>
             <a:r>
-              <a:t>             </a:t>
-            </a:r>
-            <a:r>
               <a:rPr b="1"/>
               <a:t>cumprod()</a:t>
             </a:r>
@@ -19441,9 +19938,6 @@
                 </a:solidFill>
               </a:defRPr>
             </a:pPr>
-            <a:r>
-              <a:t>             </a:t>
-            </a:r>
             <a:r>
               <a:rPr b="1"/>
               <a:t>cumsum()</a:t>
@@ -19659,9 +20153,6 @@
               </a:defRPr>
             </a:pPr>
             <a:r>
-              <a:t>             </a:t>
-            </a:r>
-            <a:r>
               <a:rPr b="1"/>
               <a:t>+, - , *, /, ^, %/%, %% </a:t>
             </a:r>
@@ -19684,9 +20175,6 @@
               </a:defRPr>
             </a:pPr>
             <a:r>
-              <a:t>             </a:t>
-            </a:r>
-            <a:r>
               <a:rPr b="1"/>
               <a:t>log(), log2(), log10() </a:t>
             </a:r>
@@ -19709,14 +20197,61 @@
               </a:defRPr>
             </a:pPr>
             <a:r>
-              <a:t>             </a:t>
-            </a:r>
-            <a:r>
               <a:rPr b="1"/>
               <a:t>&lt;, &lt;=, &gt;, &gt;=, !=, ==</a:t>
             </a:r>
             <a:r>
               <a:t> - logical comparisons</a:t>
+            </a:r>
+          </a:p>
+          <a:p>
+            <a:pPr>
+              <a:lnSpc>
+                <a:spcPct val="80000"/>
+              </a:lnSpc>
+              <a:spcBef>
+                <a:spcPts val="0"/>
+              </a:spcBef>
+              <a:defRPr b="0">
+                <a:solidFill>
+                  <a:srgbClr val="000000"/>
+                </a:solidFill>
+              </a:defRPr>
+            </a:pPr>
+            <a:r>
+              <a:t>dplyr::</a:t>
+            </a:r>
+            <a:r>
+              <a:rPr b="1"/>
+              <a:t>between()</a:t>
+            </a:r>
+            <a:r>
+              <a:t> - x &gt;= left &amp; x &lt;= right</a:t>
+            </a:r>
+          </a:p>
+          <a:p>
+            <a:pPr>
+              <a:lnSpc>
+                <a:spcPct val="80000"/>
+              </a:lnSpc>
+              <a:spcBef>
+                <a:spcPts val="0"/>
+              </a:spcBef>
+              <a:defRPr b="0">
+                <a:solidFill>
+                  <a:srgbClr val="000000"/>
+                </a:solidFill>
+              </a:defRPr>
+            </a:pPr>
+            <a:r>
+              <a:t>dplyr::</a:t>
+            </a:r>
+            <a:r>
+              <a:rPr b="1"/>
+              <a:t>near()</a:t>
+            </a:r>
+            <a:r>
+              <a:t> - safe == for floating point numbers</a:t>
             </a:r>
           </a:p>
           <a:p>
@@ -19759,10 +20294,10 @@
             </a:r>
             <a:r>
               <a:rPr b="1"/>
-              <a:t>between()</a:t>
-            </a:r>
-            <a:r>
-              <a:t> - x &gt;= left &amp; x &lt;= right</a:t>
+              <a:t>case_when()</a:t>
+            </a:r>
+            <a:r>
+              <a:t> - multi-case if_else()</a:t>
             </a:r>
           </a:p>
           <a:p>
@@ -19784,10 +20319,10 @@
             </a:r>
             <a:r>
               <a:rPr b="1"/>
-              <a:t>case_when()</a:t>
-            </a:r>
-            <a:r>
-              <a:t> - multi-case if_else()</a:t>
+              <a:t>coalesce()</a:t>
+            </a:r>
+            <a:r>
+              <a:t> - first non-NA values by element  across a set of vectors</a:t>
             </a:r>
           </a:p>
           <a:p>
@@ -19809,10 +20344,10 @@
             </a:r>
             <a:r>
               <a:rPr b="1"/>
-              <a:t>coalesce()</a:t>
-            </a:r>
-            <a:r>
-              <a:t> - first non-NA values by element  across a set of vectors</a:t>
+              <a:t>if_else()</a:t>
+            </a:r>
+            <a:r>
+              <a:t> - element-wise if() + else()</a:t>
             </a:r>
           </a:p>
           <a:p>
@@ -19834,10 +20369,10 @@
             </a:r>
             <a:r>
               <a:rPr b="1"/>
-              <a:t>if_else()</a:t>
-            </a:r>
-            <a:r>
-              <a:t> - element-wise if() + else()</a:t>
+              <a:t>na_if()</a:t>
+            </a:r>
+            <a:r>
+              <a:t> - replace specific values with NA</a:t>
             </a:r>
           </a:p>
           <a:p>
@@ -19855,14 +20390,11 @@
               </a:defRPr>
             </a:pPr>
             <a:r>
-              <a:t>dplyr::</a:t>
-            </a:r>
-            <a:r>
               <a:rPr b="1"/>
-              <a:t>na_if()</a:t>
-            </a:r>
-            <a:r>
-              <a:t> - replace specific values with NA</a:t>
+              <a:t>pmax()</a:t>
+            </a:r>
+            <a:r>
+              <a:t> - element-wise max()</a:t>
             </a:r>
           </a:p>
           <a:p>
@@ -19880,14 +20412,11 @@
               </a:defRPr>
             </a:pPr>
             <a:r>
-              <a:t>             </a:t>
-            </a:r>
-            <a:r>
               <a:rPr b="1"/>
-              <a:t>pmax()</a:t>
-            </a:r>
-            <a:r>
-              <a:t> - element-wise max()</a:t>
+              <a:t>pmin()</a:t>
+            </a:r>
+            <a:r>
+              <a:t> - element-wise min()</a:t>
             </a:r>
           </a:p>
           <a:p>
@@ -19905,14 +20434,14 @@
               </a:defRPr>
             </a:pPr>
             <a:r>
-              <a:t>             </a:t>
+              <a:t>dplyr::</a:t>
             </a:r>
             <a:r>
               <a:rPr b="1"/>
-              <a:t>pmin()</a:t>
-            </a:r>
-            <a:r>
-              <a:t> - element-wise min()</a:t>
+              <a:t>recode()</a:t>
+            </a:r>
+            <a:r>
+              <a:t> - Vectorized switch()</a:t>
             </a:r>
           </a:p>
           <a:p>
@@ -19934,31 +20463,6 @@
             </a:r>
             <a:r>
               <a:rPr b="1"/>
-              <a:t>recode()</a:t>
-            </a:r>
-            <a:r>
-              <a:t> - Vectorized switch()</a:t>
-            </a:r>
-          </a:p>
-          <a:p>
-            <a:pPr>
-              <a:lnSpc>
-                <a:spcPct val="80000"/>
-              </a:lnSpc>
-              <a:spcBef>
-                <a:spcPts val="0"/>
-              </a:spcBef>
-              <a:defRPr b="0">
-                <a:solidFill>
-                  <a:srgbClr val="000000"/>
-                </a:solidFill>
-              </a:defRPr>
-            </a:pPr>
-            <a:r>
-              <a:t>dplyr::</a:t>
-            </a:r>
-            <a:r>
-              <a:rPr b="1"/>
               <a:t>recode_factor()</a:t>
             </a:r>
             <a:r>
@@ -19973,7 +20477,7 @@
       </p:sp>
       <p:sp>
         <p:nvSpPr>
-          <p:cNvPr id="248" name="mutate() and transmute() apply vectorized functions to columns to create new columns. Vectorized functions take vectors as input and return vectors of the same length as output."/>
+          <p:cNvPr id="252" name="mutate() and transmute() apply vectorized functions to columns to create new columns. Vectorized functions take vectors as input and return vectors of the same length as output."/>
           <p:cNvSpPr txBox="1"/>
           <p:nvPr/>
         </p:nvSpPr>
@@ -20032,7 +20536,7 @@
       </p:sp>
       <p:sp>
         <p:nvSpPr>
-          <p:cNvPr id="249" name="Vector Functions"/>
+          <p:cNvPr id="253" name="Vector Functions"/>
           <p:cNvSpPr txBox="1"/>
           <p:nvPr/>
         </p:nvSpPr>
@@ -20080,7 +20584,7 @@
       </p:sp>
       <p:sp>
         <p:nvSpPr>
-          <p:cNvPr id="250" name="TO USE WITH MUTATE ()"/>
+          <p:cNvPr id="254" name="TO USE WITH MUTATE ()"/>
           <p:cNvSpPr txBox="1"/>
           <p:nvPr/>
         </p:nvSpPr>
@@ -20116,7 +20620,7 @@
       </p:sp>
       <p:sp>
         <p:nvSpPr>
-          <p:cNvPr id="251" name="Line"/>
+          <p:cNvPr id="255" name="Line"/>
           <p:cNvSpPr/>
           <p:nvPr/>
         </p:nvSpPr>
@@ -20157,7 +20661,7 @@
       </p:sp>
       <p:sp>
         <p:nvSpPr>
-          <p:cNvPr id="252" name="vectorized function"/>
+          <p:cNvPr id="256" name="vectorized function"/>
           <p:cNvSpPr txBox="1"/>
           <p:nvPr/>
         </p:nvSpPr>
@@ -20207,7 +20711,7 @@
       </p:sp>
       <p:sp>
         <p:nvSpPr>
-          <p:cNvPr id="253" name="Summary Functions"/>
+          <p:cNvPr id="257" name="Summary Functions"/>
           <p:cNvSpPr txBox="1"/>
           <p:nvPr/>
         </p:nvSpPr>
@@ -20255,7 +20759,7 @@
       </p:sp>
       <p:sp>
         <p:nvSpPr>
-          <p:cNvPr id="254" name="Line"/>
+          <p:cNvPr id="258" name="Line"/>
           <p:cNvSpPr/>
           <p:nvPr/>
         </p:nvSpPr>
@@ -20296,7 +20800,7 @@
       </p:sp>
       <p:sp>
         <p:nvSpPr>
-          <p:cNvPr id="255" name="TO USE WITH SUMMARISE ()"/>
+          <p:cNvPr id="259" name="TO USE WITH SUMMARISE ()"/>
           <p:cNvSpPr txBox="1"/>
           <p:nvPr/>
         </p:nvSpPr>
@@ -20332,7 +20836,7 @@
       </p:sp>
       <p:sp>
         <p:nvSpPr>
-          <p:cNvPr id="256" name="summarise() applies summary functions to columns to create a new table. Summary functions take vectors as input and return single values as output."/>
+          <p:cNvPr id="260" name="summarise() applies summary functions to columns to create a new table. Summary functions take vectors as input and return single values as output."/>
           <p:cNvSpPr txBox="1"/>
           <p:nvPr/>
         </p:nvSpPr>
@@ -20384,7 +20888,7 @@
       </p:sp>
       <p:sp>
         <p:nvSpPr>
-          <p:cNvPr id="257" name="COUNTS…"/>
+          <p:cNvPr id="261" name="COUNTS…"/>
           <p:cNvSpPr txBox="1"/>
           <p:nvPr/>
         </p:nvSpPr>
@@ -20485,9 +20989,6 @@
               </a:defRPr>
             </a:pPr>
             <a:r>
-              <a:t>             </a:t>
-            </a:r>
-            <a:r>
               <a:rPr b="1"/>
               <a:t>sum(!is.na())</a:t>
             </a:r>
@@ -20531,9 +21032,6 @@
               </a:defRPr>
             </a:pPr>
             <a:r>
-              <a:t>             </a:t>
-            </a:r>
-            <a:r>
               <a:rPr b="1"/>
               <a:t>mean()</a:t>
             </a:r>
@@ -20559,9 +21057,6 @@
                 </a:solidFill>
               </a:defRPr>
             </a:pPr>
-            <a:r>
-              <a:t>             </a:t>
-            </a:r>
             <a:r>
               <a:rPr b="1"/>
               <a:t>median()</a:t>
@@ -20606,9 +21101,6 @@
               </a:defRPr>
             </a:pPr>
             <a:r>
-              <a:t>             </a:t>
-            </a:r>
-            <a:r>
               <a:rPr b="1"/>
               <a:t>mean()</a:t>
             </a:r>
@@ -20630,9 +21122,6 @@
                 </a:solidFill>
               </a:defRPr>
             </a:pPr>
-            <a:r>
-              <a:t>             </a:t>
-            </a:r>
             <a:r>
               <a:rPr b="1"/>
               <a:t>sum()</a:t>
@@ -20702,7 +21191,14 @@
               </a:defRPr>
             </a:pPr>
             <a:r>
-              <a:t>dplyr::last() - last value</a:t>
+              <a:t>dplyr::</a:t>
+            </a:r>
+            <a:r>
+              <a:rPr b="1"/>
+              <a:t>last()</a:t>
+            </a:r>
+            <a:r>
+              <a:t> - last value</a:t>
             </a:r>
           </a:p>
           <a:p>
@@ -20720,7 +21216,14 @@
               </a:defRPr>
             </a:pPr>
             <a:r>
-              <a:t>dplyr::nth() - value in nth location of vector</a:t>
+              <a:t>dplyr::</a:t>
+            </a:r>
+            <a:r>
+              <a:rPr b="1"/>
+              <a:t>nth()</a:t>
+            </a:r>
+            <a:r>
+              <a:t> - value in nth location of vector</a:t>
             </a:r>
           </a:p>
           <a:p>
@@ -20759,7 +21262,11 @@
               </a:defRPr>
             </a:pPr>
             <a:r>
-              <a:t>             quantile() - nth quantile </a:t>
+              <a:rPr b="1"/>
+              <a:t>quantile()</a:t>
+            </a:r>
+            <a:r>
+              <a:t> - nth quantile </a:t>
             </a:r>
           </a:p>
           <a:p>
@@ -20777,7 +21284,11 @@
               </a:defRPr>
             </a:pPr>
             <a:r>
-              <a:t>             min() - minimum value</a:t>
+              <a:rPr b="1"/>
+              <a:t>min() </a:t>
+            </a:r>
+            <a:r>
+              <a:t>- minimum value</a:t>
             </a:r>
           </a:p>
           <a:p>
@@ -20795,7 +21306,11 @@
               </a:defRPr>
             </a:pPr>
             <a:r>
-              <a:t>             max() - maximum value</a:t>
+              <a:rPr b="1"/>
+              <a:t>max()</a:t>
+            </a:r>
+            <a:r>
+              <a:t> - maximum value</a:t>
             </a:r>
           </a:p>
           <a:p>
@@ -20834,7 +21349,11 @@
               </a:defRPr>
             </a:pPr>
             <a:r>
-              <a:t>             IQR() - Inter-Quartile Range</a:t>
+              <a:rPr b="1"/>
+              <a:t>IQR()</a:t>
+            </a:r>
+            <a:r>
+              <a:t> - Inter-Quartile Range</a:t>
             </a:r>
           </a:p>
           <a:p>
@@ -20852,7 +21371,11 @@
               </a:defRPr>
             </a:pPr>
             <a:r>
-              <a:t>             mad() - median absolute deviation</a:t>
+              <a:rPr b="1"/>
+              <a:t>mad()</a:t>
+            </a:r>
+            <a:r>
+              <a:t> - median absolute deviation</a:t>
             </a:r>
           </a:p>
           <a:p>
@@ -20870,7 +21393,11 @@
               </a:defRPr>
             </a:pPr>
             <a:r>
-              <a:t>             sd() - standard deviation</a:t>
+              <a:rPr b="1"/>
+              <a:t>sd()</a:t>
+            </a:r>
+            <a:r>
+              <a:t> - standard deviation</a:t>
             </a:r>
           </a:p>
           <a:p>
@@ -20888,14 +21415,18 @@
               </a:defRPr>
             </a:pPr>
             <a:r>
-              <a:t>             var() - variance</a:t>
+              <a:rPr b="1"/>
+              <a:t>var()</a:t>
+            </a:r>
+            <a:r>
+              <a:t> - variance</a:t>
             </a:r>
           </a:p>
         </p:txBody>
       </p:sp>
       <p:sp>
         <p:nvSpPr>
-          <p:cNvPr id="258" name="Row Names"/>
+          <p:cNvPr id="262" name="Row Names"/>
           <p:cNvSpPr txBox="1"/>
           <p:nvPr/>
         </p:nvSpPr>
@@ -20943,7 +21474,7 @@
       </p:sp>
       <p:sp>
         <p:nvSpPr>
-          <p:cNvPr id="259" name="Line"/>
+          <p:cNvPr id="263" name="Line"/>
           <p:cNvSpPr/>
           <p:nvPr/>
         </p:nvSpPr>
@@ -20984,7 +21515,7 @@
       </p:sp>
       <p:sp>
         <p:nvSpPr>
-          <p:cNvPr id="260" name="Tidy data does not use rownames, which store a variable outside of the columns. To work with the rownames, first move them into a column."/>
+          <p:cNvPr id="264" name="Tidy data does not use rownames, which store a variable outside of the columns. To work with the rownames, first move them into a column."/>
           <p:cNvSpPr txBox="1"/>
           <p:nvPr/>
         </p:nvSpPr>
@@ -21047,7 +21578,7 @@
       </p:sp>
       <p:sp>
         <p:nvSpPr>
-          <p:cNvPr id="261" name="RStudio® is a trademark of RStudio, Inc.  •  CC BY SA  RStudio •  info@rstudio.com  •  844-448-1212 • rstudio.com •  Learn more with browseVignettes(package = c(&quot;dplyr&quot;, &quot;tibble&quot;))  •  dplyr  0.5.0 •  tibble  1.2.0  •  Updated: 2017-01"/>
+          <p:cNvPr id="265" name="RStudio® is a trademark of RStudio, Inc.  •  CC BY SA  RStudio •  info@rstudio.com  •  844-448-1212 • rstudio.com •  Learn more with browseVignettes(package = c(&quot;dplyr&quot;, &quot;tibble&quot;))  •  dplyr  0.7.0 •  tibble  1.2.0  •  Updated: 2017-03"/>
           <p:cNvSpPr txBox="1"/>
           <p:nvPr/>
         </p:nvSpPr>
@@ -21115,14 +21646,14 @@
               <a:t>rstudio.com</a:t>
             </a:r>
             <a:r>
-              <a:t> •  Learn more with browseVignettes(package = c("dplyr", "tibble"))  •  dplyr  0.5.0 •  tibble  1.2.0  •  Updated: 2017-01</a:t>
+              <a:t> •  Learn more with browseVignettes(package = c("dplyr", "tibble"))  •  dplyr  0.7.0 •  tibble  1.2.0  •  Updated: 2017-03</a:t>
             </a:r>
           </a:p>
         </p:txBody>
       </p:sp>
       <p:sp>
         <p:nvSpPr>
-          <p:cNvPr id="262" name="Line"/>
+          <p:cNvPr id="266" name="Line"/>
           <p:cNvSpPr/>
           <p:nvPr/>
         </p:nvSpPr>
@@ -21163,7 +21694,7 @@
       </p:sp>
       <p:sp>
         <p:nvSpPr>
-          <p:cNvPr id="263" name="rownames_to_column()…"/>
+          <p:cNvPr id="267" name="rownames_to_column()…"/>
           <p:cNvSpPr txBox="1"/>
           <p:nvPr/>
         </p:nvSpPr>
@@ -21316,7 +21847,7 @@
       </p:sp>
       <p:pic>
         <p:nvPicPr>
-          <p:cNvPr id="264" name="Image" descr="Image"/>
+          <p:cNvPr id="268" name="Image" descr="Image"/>
           <p:cNvPicPr>
             <a:picLocks noChangeAspect="1"/>
           </p:cNvPicPr>
@@ -21345,7 +21876,7 @@
       </p:pic>
       <p:sp>
         <p:nvSpPr>
-          <p:cNvPr id="265" name="summary function"/>
+          <p:cNvPr id="269" name="summary function"/>
           <p:cNvSpPr txBox="1"/>
           <p:nvPr/>
         </p:nvSpPr>
@@ -21395,7 +21926,7 @@
       </p:sp>
       <p:graphicFrame>
         <p:nvGraphicFramePr>
-          <p:cNvPr id="266" name="Table"/>
+          <p:cNvPr id="270" name="Table"/>
           <p:cNvGraphicFramePr/>
           <p:nvPr/>
         </p:nvGraphicFramePr>
@@ -21643,7 +22174,7 @@
       </p:graphicFrame>
       <p:sp>
         <p:nvSpPr>
-          <p:cNvPr id="267" name="Also has_rownames(), remove_rownames()"/>
+          <p:cNvPr id="271" name="Also has_rownames(), remove_rownames()"/>
           <p:cNvSpPr txBox="1"/>
           <p:nvPr/>
         </p:nvSpPr>
@@ -21702,7 +22233,7 @@
       </p:sp>
       <p:sp>
         <p:nvSpPr>
-          <p:cNvPr id="268" name="Combine Tables"/>
+          <p:cNvPr id="272" name="Combine Tables"/>
           <p:cNvSpPr txBox="1"/>
           <p:nvPr/>
         </p:nvSpPr>
@@ -21750,7 +22281,7 @@
       </p:sp>
       <p:sp>
         <p:nvSpPr>
-          <p:cNvPr id="269" name="Line"/>
+          <p:cNvPr id="273" name="Line"/>
           <p:cNvSpPr/>
           <p:nvPr/>
         </p:nvSpPr>
@@ -21791,7 +22322,7 @@
       </p:sp>
       <p:sp>
         <p:nvSpPr>
-          <p:cNvPr id="270" name="COMBINE VARIABLES"/>
+          <p:cNvPr id="274" name="COMBINE VARIABLES"/>
           <p:cNvSpPr txBox="1"/>
           <p:nvPr/>
         </p:nvSpPr>
@@ -21827,7 +22358,7 @@
       </p:sp>
       <p:sp>
         <p:nvSpPr>
-          <p:cNvPr id="271" name="COMBINE CASES"/>
+          <p:cNvPr id="275" name="COMBINE CASES"/>
           <p:cNvSpPr txBox="1"/>
           <p:nvPr/>
         </p:nvSpPr>
@@ -21863,7 +22394,7 @@
       </p:sp>
       <p:sp>
         <p:nvSpPr>
-          <p:cNvPr id="272" name="Use bind_cols() to paste tables beside each other as they are.…"/>
+          <p:cNvPr id="276" name="Use bind_cols() to paste tables beside each other as they are.…"/>
           <p:cNvSpPr txBox="1"/>
           <p:nvPr/>
         </p:nvSpPr>
@@ -22029,7 +22560,7 @@
       </p:sp>
       <p:sp>
         <p:nvSpPr>
-          <p:cNvPr id="273" name="left_join(x, y, by = NULL,…"/>
+          <p:cNvPr id="277" name="left_join(x, y, by = NULL,…"/>
           <p:cNvSpPr txBox="1"/>
           <p:nvPr/>
         </p:nvSpPr>
@@ -22298,7 +22829,7 @@
       </p:sp>
       <p:sp>
         <p:nvSpPr>
-          <p:cNvPr id="274" name="Use by = c(&quot;col1&quot;, &quot;col2&quot;)  to specify the column(s) to match on.…"/>
+          <p:cNvPr id="278" name="Use by = c(&quot;col1&quot;, &quot;col2&quot;)  to specify the column(s) to match on.…"/>
           <p:cNvSpPr txBox="1"/>
           <p:nvPr/>
         </p:nvSpPr>
@@ -22487,7 +23018,7 @@
       </p:sp>
       <p:sp>
         <p:nvSpPr>
-          <p:cNvPr id="275" name="Line"/>
+          <p:cNvPr id="279" name="Line"/>
           <p:cNvSpPr/>
           <p:nvPr/>
         </p:nvSpPr>
@@ -22530,7 +23061,7 @@
       </p:sp>
       <p:sp>
         <p:nvSpPr>
-          <p:cNvPr id="276" name="Line"/>
+          <p:cNvPr id="280" name="Line"/>
           <p:cNvSpPr/>
           <p:nvPr/>
         </p:nvSpPr>
@@ -22573,7 +23104,7 @@
       </p:sp>
       <p:sp>
         <p:nvSpPr>
-          <p:cNvPr id="277" name="Use bind_rows() to paste tables below each other as they are."/>
+          <p:cNvPr id="281" name="Use bind_rows() to paste tables below each other as they are."/>
           <p:cNvSpPr txBox="1"/>
           <p:nvPr/>
         </p:nvSpPr>
@@ -22628,7 +23159,7 @@
       </p:sp>
       <p:sp>
         <p:nvSpPr>
-          <p:cNvPr id="278" name="bind_rows(…, .id = NULL)…"/>
+          <p:cNvPr id="282" name="bind_rows(…, .id = NULL)…"/>
           <p:cNvSpPr txBox="1"/>
           <p:nvPr/>
         </p:nvSpPr>
@@ -22859,7 +23390,7 @@
       </p:sp>
       <p:sp>
         <p:nvSpPr>
-          <p:cNvPr id="279" name="Use a &quot;Filtering Join&quot; to filter one table against the rows of another."/>
+          <p:cNvPr id="283" name="Use a &quot;Filtering Join&quot; to filter one table against the rows of another."/>
           <p:cNvSpPr txBox="1"/>
           <p:nvPr/>
         </p:nvSpPr>
@@ -22914,7 +23445,7 @@
       </p:sp>
       <p:sp>
         <p:nvSpPr>
-          <p:cNvPr id="280" name="semi_join(x, y, by = NULL, …)…"/>
+          <p:cNvPr id="284" name="semi_join(x, y, by = NULL, …)…"/>
           <p:cNvSpPr txBox="1"/>
           <p:nvPr/>
         </p:nvSpPr>
@@ -23033,7 +23564,7 @@
       </p:sp>
       <p:sp>
         <p:nvSpPr>
-          <p:cNvPr id="281" name="Use setequal() to test whether two data sets contain the exact same rows (in any order)."/>
+          <p:cNvPr id="285" name="Use setequal() to test whether two data sets contain the exact same rows (in any order)."/>
           <p:cNvSpPr txBox="1"/>
           <p:nvPr/>
         </p:nvSpPr>
@@ -23088,7 +23619,7 @@
       </p:sp>
       <p:sp>
         <p:nvSpPr>
-          <p:cNvPr id="282" name="Line"/>
+          <p:cNvPr id="286" name="Line"/>
           <p:cNvSpPr/>
           <p:nvPr/>
         </p:nvSpPr>
@@ -23131,7 +23662,7 @@
       </p:sp>
       <p:sp>
         <p:nvSpPr>
-          <p:cNvPr id="283" name="Line"/>
+          <p:cNvPr id="287" name="Line"/>
           <p:cNvSpPr/>
           <p:nvPr/>
         </p:nvSpPr>
@@ -23174,7 +23705,7 @@
       </p:sp>
       <p:pic>
         <p:nvPicPr>
-          <p:cNvPr id="284" name="Image" descr="Image"/>
+          <p:cNvPr id="288" name="Image" descr="Image"/>
           <p:cNvPicPr>
             <a:picLocks noChangeAspect="1"/>
           </p:cNvPicPr>
@@ -23203,7 +23734,7 @@
       </p:pic>
       <p:sp>
         <p:nvSpPr>
-          <p:cNvPr id="285" name="EXTRACT ROWS"/>
+          <p:cNvPr id="289" name="EXTRACT ROWS"/>
           <p:cNvSpPr txBox="1"/>
           <p:nvPr/>
         </p:nvSpPr>
@@ -23239,7 +23770,7 @@
       </p:sp>
       <p:sp>
         <p:nvSpPr>
-          <p:cNvPr id="286" name="Line"/>
+          <p:cNvPr id="290" name="Line"/>
           <p:cNvSpPr/>
           <p:nvPr/>
         </p:nvSpPr>
@@ -23282,7 +23813,7 @@
       </p:sp>
       <p:sp>
         <p:nvSpPr>
-          <p:cNvPr id="287" name="Line"/>
+          <p:cNvPr id="291" name="Line"/>
           <p:cNvSpPr/>
           <p:nvPr/>
         </p:nvSpPr>
@@ -23325,7 +23856,7 @@
       </p:sp>
       <p:sp>
         <p:nvSpPr>
-          <p:cNvPr id="288" name="Line"/>
+          <p:cNvPr id="292" name="Line"/>
           <p:cNvSpPr/>
           <p:nvPr/>
         </p:nvSpPr>
@@ -23368,7 +23899,7 @@
       </p:sp>
       <p:sp>
         <p:nvSpPr>
-          <p:cNvPr id="289" name="Line"/>
+          <p:cNvPr id="293" name="Line"/>
           <p:cNvSpPr/>
           <p:nvPr/>
         </p:nvSpPr>
@@ -23411,7 +23942,7 @@
       </p:sp>
       <p:pic>
         <p:nvPicPr>
-          <p:cNvPr id="290" name="1.pdf" descr="1.pdf"/>
+          <p:cNvPr id="294" name="1.pdf" descr="1.pdf"/>
           <p:cNvPicPr>
             <a:picLocks noChangeAspect="1"/>
           </p:cNvPicPr>
@@ -23442,7 +23973,7 @@
       </p:pic>
       <p:grpSp>
         <p:nvGrpSpPr>
-          <p:cNvPr id="294" name="Group"/>
+          <p:cNvPr id="298" name="Group"/>
           <p:cNvGrpSpPr/>
           <p:nvPr/>
         </p:nvGrpSpPr>
@@ -23456,7 +23987,7 @@
         </p:grpSpPr>
         <p:sp>
           <p:nvSpPr>
-            <p:cNvPr id="291" name="Line"/>
+            <p:cNvPr id="295" name="Line"/>
             <p:cNvSpPr/>
             <p:nvPr/>
           </p:nvSpPr>
@@ -23504,7 +24035,7 @@
         </p:sp>
         <p:graphicFrame>
           <p:nvGraphicFramePr>
-            <p:cNvPr id="292" name="Table"/>
+            <p:cNvPr id="296" name="Table"/>
             <p:cNvGraphicFramePr/>
             <p:nvPr/>
           </p:nvGraphicFramePr>
@@ -24116,7 +24647,7 @@
         </p:graphicFrame>
         <p:graphicFrame>
           <p:nvGraphicFramePr>
-            <p:cNvPr id="293" name="Table"/>
+            <p:cNvPr id="297" name="Table"/>
             <p:cNvGraphicFramePr/>
             <p:nvPr/>
           </p:nvGraphicFramePr>
@@ -24702,7 +25233,7 @@
       </p:grpSp>
       <p:graphicFrame>
         <p:nvGraphicFramePr>
-          <p:cNvPr id="295" name="Table"/>
+          <p:cNvPr id="299" name="Table"/>
           <p:cNvGraphicFramePr/>
           <p:nvPr/>
         </p:nvGraphicFramePr>
@@ -25279,7 +25810,7 @@
       </p:graphicFrame>
       <p:graphicFrame>
         <p:nvGraphicFramePr>
-          <p:cNvPr id="296" name="Table"/>
+          <p:cNvPr id="300" name="Table"/>
           <p:cNvGraphicFramePr/>
           <p:nvPr/>
         </p:nvGraphicFramePr>
@@ -25867,7 +26398,7 @@
       </p:graphicFrame>
       <p:sp>
         <p:nvSpPr>
-          <p:cNvPr id="297" name="Line"/>
+          <p:cNvPr id="301" name="Line"/>
           <p:cNvSpPr/>
           <p:nvPr/>
         </p:nvSpPr>
@@ -25910,7 +26441,7 @@
       </p:sp>
       <p:grpSp>
         <p:nvGrpSpPr>
-          <p:cNvPr id="306" name="Group"/>
+          <p:cNvPr id="310" name="Group"/>
           <p:cNvGrpSpPr/>
           <p:nvPr/>
         </p:nvGrpSpPr>
@@ -25924,7 +26455,7 @@
         </p:grpSpPr>
         <p:sp>
           <p:nvSpPr>
-            <p:cNvPr id="298" name="x"/>
+            <p:cNvPr id="302" name="x"/>
             <p:cNvSpPr txBox="1"/>
             <p:nvPr/>
           </p:nvSpPr>
@@ -25977,7 +26508,7 @@
         </p:sp>
         <p:sp>
           <p:nvSpPr>
-            <p:cNvPr id="299" name="y"/>
+            <p:cNvPr id="303" name="y"/>
             <p:cNvSpPr txBox="1"/>
             <p:nvPr/>
           </p:nvSpPr>
@@ -26030,7 +26561,7 @@
         </p:sp>
         <p:graphicFrame>
           <p:nvGraphicFramePr>
-            <p:cNvPr id="300" name="Table"/>
+            <p:cNvPr id="304" name="Table"/>
             <p:cNvGraphicFramePr/>
             <p:nvPr/>
           </p:nvGraphicFramePr>
@@ -26651,7 +27182,7 @@
         </p:graphicFrame>
         <p:graphicFrame>
           <p:nvGraphicFramePr>
-            <p:cNvPr id="301" name="Table"/>
+            <p:cNvPr id="305" name="Table"/>
             <p:cNvGraphicFramePr/>
             <p:nvPr/>
           </p:nvGraphicFramePr>
@@ -27272,7 +27803,7 @@
         </p:graphicFrame>
         <p:sp>
           <p:nvSpPr>
-            <p:cNvPr id="302" name="+"/>
+            <p:cNvPr id="306" name="+"/>
             <p:cNvSpPr txBox="1"/>
             <p:nvPr/>
           </p:nvSpPr>
@@ -27329,7 +27860,7 @@
         </p:sp>
         <p:sp>
           <p:nvSpPr>
-            <p:cNvPr id="303" name="="/>
+            <p:cNvPr id="307" name="="/>
             <p:cNvSpPr txBox="1"/>
             <p:nvPr/>
           </p:nvSpPr>
@@ -27386,7 +27917,7 @@
         </p:sp>
         <p:graphicFrame>
           <p:nvGraphicFramePr>
-            <p:cNvPr id="304" name="Table"/>
+            <p:cNvPr id="308" name="Table"/>
             <p:cNvGraphicFramePr/>
             <p:nvPr/>
           </p:nvGraphicFramePr>
@@ -28007,7 +28538,7 @@
         </p:graphicFrame>
         <p:graphicFrame>
           <p:nvGraphicFramePr>
-            <p:cNvPr id="305" name="Table"/>
+            <p:cNvPr id="309" name="Table"/>
             <p:cNvGraphicFramePr/>
             <p:nvPr/>
           </p:nvGraphicFramePr>
@@ -28629,7 +29160,7 @@
       </p:grpSp>
       <p:graphicFrame>
         <p:nvGraphicFramePr>
-          <p:cNvPr id="307" name="Table"/>
+          <p:cNvPr id="311" name="Table"/>
           <p:cNvGraphicFramePr/>
           <p:nvPr/>
         </p:nvGraphicFramePr>
@@ -29400,7 +29931,7 @@
       </p:graphicFrame>
       <p:graphicFrame>
         <p:nvGraphicFramePr>
-          <p:cNvPr id="308" name="Table"/>
+          <p:cNvPr id="312" name="Table"/>
           <p:cNvGraphicFramePr/>
           <p:nvPr/>
         </p:nvGraphicFramePr>
@@ -30177,7 +30708,7 @@
       </p:graphicFrame>
       <p:graphicFrame>
         <p:nvGraphicFramePr>
-          <p:cNvPr id="309" name="Table"/>
+          <p:cNvPr id="313" name="Table"/>
           <p:cNvGraphicFramePr/>
           <p:nvPr/>
         </p:nvGraphicFramePr>
@@ -30773,7 +31304,7 @@
       </p:graphicFrame>
       <p:graphicFrame>
         <p:nvGraphicFramePr>
-          <p:cNvPr id="310" name="Table"/>
+          <p:cNvPr id="314" name="Table"/>
           <p:cNvGraphicFramePr/>
           <p:nvPr/>
         </p:nvGraphicFramePr>
@@ -31719,7 +32250,7 @@
       </p:graphicFrame>
       <p:graphicFrame>
         <p:nvGraphicFramePr>
-          <p:cNvPr id="311" name="Table"/>
+          <p:cNvPr id="315" name="Table"/>
           <p:cNvGraphicFramePr/>
           <p:nvPr/>
         </p:nvGraphicFramePr>
@@ -32673,7 +33204,7 @@
       </p:graphicFrame>
       <p:graphicFrame>
         <p:nvGraphicFramePr>
-          <p:cNvPr id="312" name="Table"/>
+          <p:cNvPr id="316" name="Table"/>
           <p:cNvGraphicFramePr/>
           <p:nvPr/>
         </p:nvGraphicFramePr>
@@ -33633,7 +34164,7 @@
       </p:graphicFrame>
       <p:graphicFrame>
         <p:nvGraphicFramePr>
-          <p:cNvPr id="313" name="Table"/>
+          <p:cNvPr id="317" name="Table"/>
           <p:cNvGraphicFramePr/>
           <p:nvPr/>
         </p:nvGraphicFramePr>
@@ -34593,7 +35124,7 @@
       </p:graphicFrame>
       <p:grpSp>
         <p:nvGrpSpPr>
-          <p:cNvPr id="320" name="Group"/>
+          <p:cNvPr id="324" name="Group"/>
           <p:cNvGrpSpPr/>
           <p:nvPr/>
         </p:nvGrpSpPr>
@@ -34607,7 +35138,7 @@
         </p:grpSpPr>
         <p:sp>
           <p:nvSpPr>
-            <p:cNvPr id="314" name="x"/>
+            <p:cNvPr id="318" name="x"/>
             <p:cNvSpPr txBox="1"/>
             <p:nvPr/>
           </p:nvSpPr>
@@ -34660,7 +35191,7 @@
         </p:sp>
         <p:sp>
           <p:nvSpPr>
-            <p:cNvPr id="315" name="y"/>
+            <p:cNvPr id="319" name="y"/>
             <p:cNvSpPr txBox="1"/>
             <p:nvPr/>
           </p:nvSpPr>
@@ -34713,7 +35244,7 @@
         </p:sp>
         <p:graphicFrame>
           <p:nvGraphicFramePr>
-            <p:cNvPr id="316" name="Table"/>
+            <p:cNvPr id="320" name="Table"/>
             <p:cNvGraphicFramePr/>
             <p:nvPr/>
           </p:nvGraphicFramePr>
@@ -35334,7 +35865,7 @@
         </p:graphicFrame>
         <p:graphicFrame>
           <p:nvGraphicFramePr>
-            <p:cNvPr id="317" name="Table"/>
+            <p:cNvPr id="321" name="Table"/>
             <p:cNvGraphicFramePr/>
             <p:nvPr/>
           </p:nvGraphicFramePr>
@@ -35812,7 +36343,7 @@
         </p:graphicFrame>
         <p:sp>
           <p:nvSpPr>
-            <p:cNvPr id="318" name="+"/>
+            <p:cNvPr id="322" name="+"/>
             <p:cNvSpPr txBox="1"/>
             <p:nvPr/>
           </p:nvSpPr>
@@ -35869,7 +36400,7 @@
         </p:sp>
         <p:sp>
           <p:nvSpPr>
-            <p:cNvPr id="319" name="Line"/>
+            <p:cNvPr id="323" name="Line"/>
             <p:cNvSpPr/>
             <p:nvPr/>
           </p:nvSpPr>
@@ -35916,7 +36447,7 @@
       </p:grpSp>
       <p:graphicFrame>
         <p:nvGraphicFramePr>
-          <p:cNvPr id="321" name="Table"/>
+          <p:cNvPr id="325" name="Table"/>
           <p:cNvGraphicFramePr/>
           <p:nvPr/>
         </p:nvGraphicFramePr>
@@ -37046,7 +37577,7 @@
       </p:graphicFrame>
       <p:graphicFrame>
         <p:nvGraphicFramePr>
-          <p:cNvPr id="322" name="Table"/>
+          <p:cNvPr id="326" name="Table"/>
           <p:cNvGraphicFramePr/>
           <p:nvPr/>
         </p:nvGraphicFramePr>
@@ -37366,7 +37897,7 @@
       </p:graphicFrame>
       <p:graphicFrame>
         <p:nvGraphicFramePr>
-          <p:cNvPr id="323" name="Table"/>
+          <p:cNvPr id="327" name="Table"/>
           <p:cNvGraphicFramePr/>
           <p:nvPr/>
         </p:nvGraphicFramePr>
@@ -38088,7 +38619,7 @@
       </p:graphicFrame>
       <p:graphicFrame>
         <p:nvGraphicFramePr>
-          <p:cNvPr id="324" name="Table"/>
+          <p:cNvPr id="328" name="Table"/>
           <p:cNvGraphicFramePr/>
           <p:nvPr/>
         </p:nvGraphicFramePr>
@@ -38542,7 +39073,7 @@
       </p:graphicFrame>
       <p:pic>
         <p:nvPicPr>
-          <p:cNvPr id="325" name="Image" descr="Image"/>
+          <p:cNvPr id="329" name="Image" descr="Image"/>
           <p:cNvPicPr>
             <a:picLocks noChangeAspect="1"/>
           </p:cNvPicPr>
@@ -38571,7 +39102,7 @@
       </p:pic>
       <p:pic>
         <p:nvPicPr>
-          <p:cNvPr id="326" name="Image" descr="Image"/>
+          <p:cNvPr id="330" name="Image" descr="Image"/>
           <p:cNvPicPr>
             <a:picLocks noChangeAspect="1"/>
           </p:cNvPicPr>
@@ -38600,7 +39131,7 @@
       </p:pic>
       <p:pic>
         <p:nvPicPr>
-          <p:cNvPr id="327" name="Image" descr="Image"/>
+          <p:cNvPr id="331" name="Image" descr="Image"/>
           <p:cNvPicPr>
             <a:picLocks noChangeAspect="1"/>
           </p:cNvPicPr>
@@ -38629,7 +39160,7 @@
       </p:pic>
       <p:sp>
         <p:nvSpPr>
-          <p:cNvPr id="328" name="x"/>
+          <p:cNvPr id="332" name="x"/>
           <p:cNvSpPr txBox="1"/>
           <p:nvPr/>
         </p:nvSpPr>
@@ -38679,7 +39210,7 @@
       </p:sp>
       <p:sp>
         <p:nvSpPr>
-          <p:cNvPr id="329" name="y"/>
+          <p:cNvPr id="333" name="y"/>
           <p:cNvSpPr txBox="1"/>
           <p:nvPr/>
         </p:nvSpPr>
@@ -38729,7 +39260,7 @@
       </p:sp>
       <p:graphicFrame>
         <p:nvGraphicFramePr>
-          <p:cNvPr id="330" name="Table"/>
+          <p:cNvPr id="334" name="Table"/>
           <p:cNvGraphicFramePr/>
           <p:nvPr/>
         </p:nvGraphicFramePr>
@@ -39317,7 +39848,7 @@
       </p:graphicFrame>
       <p:graphicFrame>
         <p:nvGraphicFramePr>
-          <p:cNvPr id="331" name="Table"/>
+          <p:cNvPr id="335" name="Table"/>
           <p:cNvGraphicFramePr/>
           <p:nvPr/>
         </p:nvGraphicFramePr>
@@ -39905,7 +40436,7 @@
       </p:graphicFrame>
       <p:sp>
         <p:nvSpPr>
-          <p:cNvPr id="332" name="+"/>
+          <p:cNvPr id="336" name="+"/>
           <p:cNvSpPr txBox="1"/>
           <p:nvPr/>
         </p:nvSpPr>
@@ -39959,7 +40490,7 @@
       </p:sp>
       <p:sp>
         <p:nvSpPr>
-          <p:cNvPr id="333" name="="/>
+          <p:cNvPr id="337" name="="/>
           <p:cNvSpPr txBox="1"/>
           <p:nvPr/>
         </p:nvSpPr>
@@ -40013,7 +40544,7 @@
       </p:sp>
       <p:graphicFrame>
         <p:nvGraphicFramePr>
-          <p:cNvPr id="334" name="Table"/>
+          <p:cNvPr id="338" name="Table"/>
           <p:cNvGraphicFramePr/>
           <p:nvPr/>
         </p:nvGraphicFramePr>
@@ -40333,7 +40864,7 @@
       </p:graphicFrame>
       <p:graphicFrame>
         <p:nvGraphicFramePr>
-          <p:cNvPr id="335" name="Table"/>
+          <p:cNvPr id="339" name="Table"/>
           <p:cNvGraphicFramePr/>
           <p:nvPr/>
         </p:nvGraphicFramePr>
@@ -40787,7 +41318,7 @@
       </p:graphicFrame>
       <p:sp>
         <p:nvSpPr>
-          <p:cNvPr id="336" name="Line"/>
+          <p:cNvPr id="340" name="Line"/>
           <p:cNvSpPr/>
           <p:nvPr/>
         </p:nvSpPr>

</xml_diff>

<commit_message>
Clarifies combining tables section of dplyr cheatsheet. Fixes #41.
</commit_message>
<xml_diff>
--- a/powerpoints/data-transformation.pptx
+++ b/powerpoints/data-transformation.pptx
@@ -15162,8 +15162,8 @@
           <p:nvPr/>
         </p:nvGraphicFramePr>
         <p:xfrm>
-          <a:off x="9427123" y="6951106"/>
-          <a:ext cx="357982" cy="462757"/>
+          <a:off x="9427123" y="6951105"/>
+          <a:ext cx="357982" cy="462758"/>
         </p:xfrm>
         <a:graphic xmlns:a="http://schemas.openxmlformats.org/drawingml/2006/main">
           <a:graphicData uri="http://schemas.openxmlformats.org/drawingml/2006/table">
@@ -15444,8 +15444,8 @@
           <p:nvPr/>
         </p:nvGraphicFramePr>
         <p:xfrm>
-          <a:off x="9960523" y="6953455"/>
-          <a:ext cx="122238" cy="471489"/>
+          <a:off x="9960523" y="6953456"/>
+          <a:ext cx="122238" cy="471488"/>
         </p:xfrm>
         <a:graphic xmlns:a="http://schemas.openxmlformats.org/drawingml/2006/main">
           <a:graphicData uri="http://schemas.openxmlformats.org/drawingml/2006/table">
@@ -19393,7 +19393,7 @@
           <p:nvPr/>
         </p:nvGraphicFramePr>
         <p:xfrm>
-          <a:off x="9983632" y="3361924"/>
+          <a:off x="9983632" y="3361925"/>
           <a:ext cx="650940" cy="609601"/>
         </p:xfrm>
         <a:graphic xmlns:a="http://schemas.openxmlformats.org/drawingml/2006/main">
@@ -19520,7 +19520,7 @@
         </p:nvSpPr>
         <p:spPr>
           <a:xfrm>
-            <a:off x="9811046" y="3577824"/>
+            <a:off x="9811046" y="3577825"/>
             <a:ext cx="139606" cy="1"/>
           </a:xfrm>
           <a:prstGeom prst="line">
@@ -22829,14 +22829,14 @@
       </p:sp>
       <p:sp>
         <p:nvSpPr>
-          <p:cNvPr id="278" name="Use by = c(&quot;col1&quot;, &quot;col2&quot;)  to specify the column(s) to match on.…"/>
+          <p:cNvPr id="278" name="Use by = c(&quot;col1&quot;, &quot;col2&quot;, …)  to specify one or more common columns to match on.…"/>
           <p:cNvSpPr txBox="1"/>
           <p:nvPr/>
         </p:nvSpPr>
         <p:spPr>
           <a:xfrm>
             <a:off x="7899607" y="7370905"/>
-            <a:ext cx="2321241" cy="2327768"/>
+            <a:ext cx="2321241" cy="2734168"/>
           </a:xfrm>
           <a:prstGeom prst="rect">
             <a:avLst/>
@@ -22874,10 +22874,10 @@
             </a:r>
             <a:r>
               <a:rPr b="1"/>
-              <a:t>by = c("col1", "col2")</a:t>
-            </a:r>
-            <a:r>
-              <a:t>  to specify the column(s) to match on.</a:t>
+              <a:t>by = c("col1", "col2", …)</a:t>
+            </a:r>
+            <a:r>
+              <a:t>  to specify one or more common columns to match on.</a:t>
             </a:r>
           </a:p>
           <a:p>
@@ -22935,7 +22935,7 @@
               <a:t>by = c("col1" = "col2")</a:t>
             </a:r>
             <a:r>
-              <a:t>, to match on columns with different names in each data set.</a:t>
+              <a:t>, to match on columns that have different names in each table.</a:t>
             </a:r>
           </a:p>
           <a:p>
@@ -22993,7 +22993,7 @@
               <a:t>suffix</a:t>
             </a:r>
             <a:r>
-              <a:t> to specify suffix to give to duplicate column names.</a:t>
+              <a:t> to specify the suffix to give to unmatched columns that have the same name in both tables.</a:t>
             </a:r>
           </a:p>
           <a:p>
@@ -32255,7 +32255,7 @@
           <p:nvPr/>
         </p:nvGraphicFramePr>
         <p:xfrm>
-          <a:off x="7178788" y="7366949"/>
+          <a:off x="7178788" y="7405049"/>
           <a:ext cx="5729883" cy="6139161"/>
         </p:xfrm>
         <a:graphic xmlns:a="http://schemas.openxmlformats.org/drawingml/2006/main">
@@ -33209,7 +33209,7 @@
           <p:nvPr/>
         </p:nvGraphicFramePr>
         <p:xfrm>
-          <a:off x="7127988" y="8015690"/>
+          <a:off x="7127988" y="8155390"/>
           <a:ext cx="5729883" cy="6139161"/>
         </p:xfrm>
         <a:graphic xmlns:a="http://schemas.openxmlformats.org/drawingml/2006/main">
@@ -34169,7 +34169,7 @@
           <p:nvPr/>
         </p:nvGraphicFramePr>
         <p:xfrm>
-          <a:off x="7127988" y="8792842"/>
+          <a:off x="7127988" y="8945242"/>
           <a:ext cx="5729883" cy="6139161"/>
         </p:xfrm>
         <a:graphic xmlns:a="http://schemas.openxmlformats.org/drawingml/2006/main">

</xml_diff>